<commit_message>
modified SpyTorch-1.pptx, 24-05-13 세미나 ppt
</commit_message>
<xml_diff>
--- a/cs semina/07_Spytorch-1.pptx
+++ b/cs semina/07_Spytorch-1.pptx
@@ -5,7 +5,7 @@
     <p:sldMasterId id="2147483750" r:id="rId1"/>
   </p:sldMasterIdLst>
   <p:notesMasterIdLst>
-    <p:notesMasterId r:id="rId15"/>
+    <p:notesMasterId r:id="rId20"/>
   </p:notesMasterIdLst>
   <p:sldIdLst>
     <p:sldId id="256" r:id="rId2"/>
@@ -18,9 +18,14 @@
     <p:sldId id="270" r:id="rId9"/>
     <p:sldId id="272" r:id="rId10"/>
     <p:sldId id="274" r:id="rId11"/>
-    <p:sldId id="273" r:id="rId12"/>
-    <p:sldId id="263" r:id="rId13"/>
-    <p:sldId id="257" r:id="rId14"/>
+    <p:sldId id="276" r:id="rId12"/>
+    <p:sldId id="277" r:id="rId13"/>
+    <p:sldId id="275" r:id="rId14"/>
+    <p:sldId id="278" r:id="rId15"/>
+    <p:sldId id="279" r:id="rId16"/>
+    <p:sldId id="280" r:id="rId17"/>
+    <p:sldId id="263" r:id="rId18"/>
+    <p:sldId id="257" r:id="rId19"/>
   </p:sldIdLst>
   <p:sldSz cx="9144000" cy="6858000" type="screen4x3"/>
   <p:notesSz cx="6797675" cy="9874250"/>
@@ -277,7 +282,7 @@
           <a:p>
             <a:fld id="{57764B8E-7EC0-4B59-8DA5-E04CAE3DB5F2}" type="datetimeFigureOut">
               <a:rPr lang="ko-KR" altLang="en-US" smtClean="0"/>
-              <a:t>2024. 5. 12.</a:t>
+              <a:t>2024-05-13</a:t>
             </a:fld>
             <a:endParaRPr lang="ko-KR" altLang="en-US"/>
           </a:p>
@@ -4480,15 +4485,61 @@
             <p:ph idx="1"/>
           </p:nvPr>
         </p:nvSpPr>
-        <p:spPr/>
+        <p:spPr>
+          <a:xfrm>
+            <a:off x="828675" y="2348880"/>
+            <a:ext cx="7991475" cy="3975720"/>
+          </a:xfrm>
+        </p:spPr>
         <p:txBody>
           <a:bodyPr/>
           <a:lstStyle/>
           <a:p>
-            <a:endParaRPr kumimoji="1" lang="ko-KR" altLang="en-US"/>
+            <a:r>
+              <a:rPr kumimoji="1" lang="ko-KR" altLang="en-US" dirty="0"/>
+              <a:t>시간에</a:t>
+            </a:r>
+            <a:r>
+              <a:rPr kumimoji="1" lang="en-US" altLang="ko-KR" dirty="0"/>
+              <a:t> </a:t>
+            </a:r>
+            <a:r>
+              <a:rPr kumimoji="1" lang="ko-KR" altLang="en-US" dirty="0"/>
+              <a:t>따른 전류의 변화량을 표현</a:t>
+            </a:r>
           </a:p>
         </p:txBody>
       </p:sp>
+      <p:pic>
+        <p:nvPicPr>
+          <p:cNvPr id="5" name="그림 4">
+            <a:extLst>
+              <a:ext uri="{FF2B5EF4-FFF2-40B4-BE49-F238E27FC236}">
+                <a16:creationId xmlns:a16="http://schemas.microsoft.com/office/drawing/2014/main" id="{02646FBA-E62C-141A-BE5C-C2D05FE48EAE}"/>
+              </a:ext>
+            </a:extLst>
+          </p:cNvPr>
+          <p:cNvPicPr>
+            <a:picLocks noChangeAspect="1"/>
+          </p:cNvPicPr>
+          <p:nvPr/>
+        </p:nvPicPr>
+        <p:blipFill>
+          <a:blip r:embed="rId2"/>
+          <a:stretch>
+            <a:fillRect/>
+          </a:stretch>
+        </p:blipFill>
+        <p:spPr>
+          <a:xfrm>
+            <a:off x="828674" y="1052736"/>
+            <a:ext cx="6218335" cy="1152128"/>
+          </a:xfrm>
+          <a:prstGeom prst="rect">
+            <a:avLst/>
+          </a:prstGeom>
+        </p:spPr>
+      </p:pic>
     </p:spTree>
     <p:extLst>
       <p:ext uri="{BB962C8B-B14F-4D97-AF65-F5344CB8AC3E}">
@@ -4524,7 +4575,7 @@
           <p:cNvPr id="2" name="제목 1">
             <a:extLst>
               <a:ext uri="{FF2B5EF4-FFF2-40B4-BE49-F238E27FC236}">
-                <a16:creationId xmlns:a16="http://schemas.microsoft.com/office/drawing/2014/main" id="{07359586-DFAB-2AB3-BDE1-AE924CA3BE39}"/>
+                <a16:creationId xmlns:a16="http://schemas.microsoft.com/office/drawing/2014/main" id="{260F90FB-FE33-02CB-3C30-932B9E853787}"/>
               </a:ext>
             </a:extLst>
           </p:cNvPr>
@@ -4541,62 +4592,269 @@
           <a:lstStyle/>
           <a:p>
             <a:r>
-              <a:rPr kumimoji="1" lang="ko-KR" altLang="en-US" sz="3200" dirty="0"/>
-              <a:t>이산시간으로 표현된 </a:t>
-            </a:r>
-            <a:r>
-              <a:rPr kumimoji="1" lang="en-US" altLang="ko-KR" sz="3200" dirty="0"/>
-              <a:t>RNN </a:t>
-            </a:r>
-            <a:r>
-              <a:rPr kumimoji="1" lang="ko-KR" altLang="en-US" sz="3200" dirty="0"/>
-              <a:t>방정식 </a:t>
-            </a:r>
-            <a:r>
-              <a:rPr kumimoji="1" lang="en-US" altLang="ko-KR" sz="3200" dirty="0"/>
+              <a:rPr lang="ko-KR" altLang="en-US" dirty="0"/>
+              <a:t>입력 전류의 변화 </a:t>
+            </a:r>
+            <a:r>
+              <a:rPr lang="en-US" altLang="ko-KR" dirty="0"/>
               <a:t>-</a:t>
             </a:r>
             <a:r>
-              <a:rPr kumimoji="1" lang="ko-KR" altLang="en-US" sz="3200" dirty="0"/>
+              <a:rPr lang="ko-KR" altLang="en-US" dirty="0"/>
               <a:t> </a:t>
             </a:r>
             <a:r>
-              <a:rPr kumimoji="1" lang="en-US" altLang="ko-KR" sz="3200" dirty="0"/>
-              <a:t>reset</a:t>
-            </a:r>
-            <a:endParaRPr kumimoji="1" lang="ko-KR" altLang="en-US" sz="3200" dirty="0"/>
+              <a:rPr lang="en-US" altLang="ko-KR" dirty="0"/>
+              <a:t>input</a:t>
+            </a:r>
+            <a:endParaRPr kumimoji="1" lang="ko-KR" altLang="en-US" dirty="0"/>
           </a:p>
         </p:txBody>
       </p:sp>
-      <p:sp>
-        <p:nvSpPr>
-          <p:cNvPr id="3" name="내용 개체 틀 2">
+      <mc:AlternateContent xmlns:mc="http://schemas.openxmlformats.org/markup-compatibility/2006">
+        <mc:Choice xmlns:a14="http://schemas.microsoft.com/office/drawing/2010/main" Requires="a14">
+          <p:sp>
+            <p:nvSpPr>
+              <p:cNvPr id="3" name="내용 개체 틀 2">
+                <a:extLst>
+                  <a:ext uri="{FF2B5EF4-FFF2-40B4-BE49-F238E27FC236}">
+                    <a16:creationId xmlns:a16="http://schemas.microsoft.com/office/drawing/2014/main" id="{1114E9FF-3AE3-F0F0-A3BB-961E1E437D1C}"/>
+                  </a:ext>
+                </a:extLst>
+              </p:cNvPr>
+              <p:cNvSpPr>
+                <a:spLocks noGrp="1"/>
+              </p:cNvSpPr>
+              <p:nvPr>
+                <p:ph idx="1"/>
+              </p:nvPr>
+            </p:nvSpPr>
+            <p:spPr>
+              <a:xfrm>
+                <a:off x="828675" y="2348880"/>
+                <a:ext cx="7991475" cy="3975720"/>
+              </a:xfrm>
+            </p:spPr>
+            <p:txBody>
+              <a:bodyPr>
+                <a:normAutofit/>
+              </a:bodyPr>
+              <a:lstStyle/>
+              <a:p>
+                <a14:m>
+                  <m:oMath xmlns:m="http://schemas.openxmlformats.org/officeDocument/2006/math">
+                    <m:sSub>
+                      <m:sSubPr>
+                        <m:ctrlPr>
+                          <a:rPr kumimoji="1" lang="en-US" altLang="ko-KR" i="1" smtClean="0">
+                            <a:latin typeface="Cambria Math" panose="02040503050406030204" pitchFamily="18" charset="0"/>
+                          </a:rPr>
+                        </m:ctrlPr>
+                      </m:sSubPr>
+                      <m:e>
+                        <m:r>
+                          <a:rPr kumimoji="1" lang="en-US" altLang="ko-KR" b="0" i="1" smtClean="0">
+                            <a:latin typeface="Cambria Math" panose="02040503050406030204" pitchFamily="18" charset="0"/>
+                          </a:rPr>
+                          <m:t>𝑊</m:t>
+                        </m:r>
+                      </m:e>
+                      <m:sub>
+                        <m:r>
+                          <a:rPr kumimoji="1" lang="en-US" altLang="ko-KR" b="0" i="1" smtClean="0">
+                            <a:latin typeface="Cambria Math" panose="02040503050406030204" pitchFamily="18" charset="0"/>
+                          </a:rPr>
+                          <m:t>𝑖𝑗</m:t>
+                        </m:r>
+                      </m:sub>
+                    </m:sSub>
+                  </m:oMath>
+                </a14:m>
+                <a:r>
+                  <a:rPr kumimoji="1" lang="ko-KR" altLang="en-US" dirty="0"/>
+                  <a:t> </a:t>
+                </a:r>
+                <a:r>
+                  <a:rPr kumimoji="1" lang="en-US" altLang="ko-KR" dirty="0"/>
+                  <a:t>: </a:t>
+                </a:r>
+                <a:r>
+                  <a:rPr kumimoji="1" lang="ko-KR" altLang="en-US" dirty="0"/>
+                  <a:t>시냅스</a:t>
+                </a:r>
+                <a:r>
+                  <a:rPr kumimoji="1" lang="en-US" altLang="ko-KR" dirty="0"/>
+                  <a:t> </a:t>
+                </a:r>
+                <a:r>
+                  <a:rPr kumimoji="1" lang="ko-KR" altLang="en-US" dirty="0"/>
+                  <a:t>가중치 행렬</a:t>
+                </a:r>
+                <a:endParaRPr lang="en-US" altLang="ko-KR" dirty="0"/>
+              </a:p>
+              <a:p>
+                <a:pPr lvl="1"/>
+                <a:r>
+                  <a:rPr kumimoji="1" lang="en-US" altLang="ko-KR" dirty="0"/>
+                  <a:t>feed-forward(</a:t>
+                </a:r>
+                <a:r>
+                  <a:rPr kumimoji="1" lang="ko-KR" altLang="en-US" dirty="0"/>
+                  <a:t>순방향</a:t>
+                </a:r>
+                <a:r>
+                  <a:rPr kumimoji="1" lang="en-US" altLang="ko-KR" dirty="0"/>
+                  <a:t>)</a:t>
+                </a:r>
+              </a:p>
+              <a:p>
+                <a14:m>
+                  <m:oMath xmlns:m="http://schemas.openxmlformats.org/officeDocument/2006/math">
+                    <m:sSub>
+                      <m:sSubPr>
+                        <m:ctrlPr>
+                          <a:rPr kumimoji="1" lang="en-US" altLang="ko-KR" i="1" smtClean="0">
+                            <a:latin typeface="Cambria Math" panose="02040503050406030204" pitchFamily="18" charset="0"/>
+                          </a:rPr>
+                        </m:ctrlPr>
+                      </m:sSubPr>
+                      <m:e>
+                        <m:r>
+                          <a:rPr kumimoji="1" lang="en-US" altLang="ko-KR" b="0" i="1" smtClean="0">
+                            <a:latin typeface="Cambria Math" panose="02040503050406030204" pitchFamily="18" charset="0"/>
+                          </a:rPr>
+                          <m:t>𝑉</m:t>
+                        </m:r>
+                      </m:e>
+                      <m:sub>
+                        <m:r>
+                          <a:rPr kumimoji="1" lang="en-US" altLang="ko-KR" b="0" i="1" smtClean="0">
+                            <a:latin typeface="Cambria Math" panose="02040503050406030204" pitchFamily="18" charset="0"/>
+                          </a:rPr>
+                          <m:t>𝑖𝑗</m:t>
+                        </m:r>
+                      </m:sub>
+                    </m:sSub>
+                  </m:oMath>
+                </a14:m>
+                <a:r>
+                  <a:rPr kumimoji="1" lang="ko-KR" altLang="en-US" dirty="0"/>
+                  <a:t> </a:t>
+                </a:r>
+                <a:r>
+                  <a:rPr kumimoji="1" lang="en-US" altLang="ko-KR" dirty="0"/>
+                  <a:t>: </a:t>
+                </a:r>
+                <a:r>
+                  <a:rPr kumimoji="1" lang="ko-KR" altLang="en-US" dirty="0"/>
+                  <a:t>시냅스 가중치 행렬</a:t>
+                </a:r>
+                <a:endParaRPr lang="en-US" altLang="ko-KR" dirty="0"/>
+              </a:p>
+              <a:p>
+                <a:pPr lvl="1"/>
+                <a:r>
+                  <a:rPr kumimoji="1" lang="en-US" altLang="ko-KR" dirty="0"/>
+                  <a:t>recurrent(</a:t>
+                </a:r>
+                <a:r>
+                  <a:rPr kumimoji="1" lang="ko-KR" altLang="en-US" dirty="0"/>
+                  <a:t>순환</a:t>
+                </a:r>
+                <a:r>
+                  <a:rPr kumimoji="1" lang="en-US" altLang="ko-KR" dirty="0"/>
+                  <a:t>)</a:t>
+                </a:r>
+              </a:p>
+              <a:p>
+                <a:pPr lvl="1"/>
+                <a:r>
+                  <a:rPr lang="ko-KR" altLang="en-US" dirty="0"/>
+                  <a:t>이전 출력을 현재 단계의 입력으로 사용</a:t>
+                </a:r>
+                <a:endParaRPr kumimoji="1" lang="en-US" altLang="ko-KR" dirty="0"/>
+              </a:p>
+            </p:txBody>
+          </p:sp>
+        </mc:Choice>
+        <mc:Fallback>
+          <p:sp>
+            <p:nvSpPr>
+              <p:cNvPr id="3" name="내용 개체 틀 2">
+                <a:extLst>
+                  <a:ext uri="{FF2B5EF4-FFF2-40B4-BE49-F238E27FC236}">
+                    <a16:creationId xmlns:a16="http://schemas.microsoft.com/office/drawing/2014/main" id="{1114E9FF-3AE3-F0F0-A3BB-961E1E437D1C}"/>
+                  </a:ext>
+                </a:extLst>
+              </p:cNvPr>
+              <p:cNvSpPr>
+                <a:spLocks noGrp="1" noRot="1" noChangeAspect="1" noMove="1" noResize="1" noEditPoints="1" noAdjustHandles="1" noChangeArrowheads="1" noChangeShapeType="1" noTextEdit="1"/>
+              </p:cNvSpPr>
+              <p:nvPr>
+                <p:ph idx="1"/>
+              </p:nvPr>
+            </p:nvSpPr>
+            <p:spPr>
+              <a:xfrm>
+                <a:off x="828675" y="2348880"/>
+                <a:ext cx="7991475" cy="3975720"/>
+              </a:xfrm>
+              <a:blipFill>
+                <a:blip r:embed="rId2"/>
+                <a:stretch>
+                  <a:fillRect t="-1991"/>
+                </a:stretch>
+              </a:blipFill>
+            </p:spPr>
+            <p:txBody>
+              <a:bodyPr/>
+              <a:lstStyle/>
+              <a:p>
+                <a:r>
+                  <a:rPr lang="ko-KR" altLang="en-US">
+                    <a:noFill/>
+                  </a:rPr>
+                  <a:t> </a:t>
+                </a:r>
+              </a:p>
+            </p:txBody>
+          </p:sp>
+        </mc:Fallback>
+      </mc:AlternateContent>
+      <p:pic>
+        <p:nvPicPr>
+          <p:cNvPr id="5" name="그림 4">
             <a:extLst>
               <a:ext uri="{FF2B5EF4-FFF2-40B4-BE49-F238E27FC236}">
-                <a16:creationId xmlns:a16="http://schemas.microsoft.com/office/drawing/2014/main" id="{7741098F-5B9B-C253-3F34-AC153AAA4B25}"/>
+                <a16:creationId xmlns:a16="http://schemas.microsoft.com/office/drawing/2014/main" id="{02646FBA-E62C-141A-BE5C-C2D05FE48EAE}"/>
               </a:ext>
             </a:extLst>
           </p:cNvPr>
-          <p:cNvSpPr>
-            <a:spLocks noGrp="1"/>
-          </p:cNvSpPr>
-          <p:nvPr>
-            <p:ph idx="1"/>
-          </p:nvPr>
-        </p:nvSpPr>
-        <p:spPr/>
-        <p:txBody>
-          <a:bodyPr/>
-          <a:lstStyle/>
-          <a:p>
-            <a:endParaRPr kumimoji="1" lang="ko-KR" altLang="en-US"/>
-          </a:p>
-        </p:txBody>
-      </p:sp>
+          <p:cNvPicPr>
+            <a:picLocks noChangeAspect="1"/>
+          </p:cNvPicPr>
+          <p:nvPr/>
+        </p:nvPicPr>
+        <p:blipFill>
+          <a:blip r:embed="rId3"/>
+          <a:stretch>
+            <a:fillRect/>
+          </a:stretch>
+        </p:blipFill>
+        <p:spPr>
+          <a:xfrm>
+            <a:off x="828674" y="1052736"/>
+            <a:ext cx="6218335" cy="1152128"/>
+          </a:xfrm>
+          <a:prstGeom prst="rect">
+            <a:avLst/>
+          </a:prstGeom>
+        </p:spPr>
+      </p:pic>
     </p:spTree>
     <p:extLst>
       <p:ext uri="{BB962C8B-B14F-4D97-AF65-F5344CB8AC3E}">
-        <p14:creationId xmlns:p14="http://schemas.microsoft.com/office/powerpoint/2010/main" val="229719669"/>
+        <p14:creationId xmlns:p14="http://schemas.microsoft.com/office/powerpoint/2010/main" val="2764176937"/>
       </p:ext>
     </p:extLst>
   </p:cSld>
@@ -4607,6 +4865,2502 @@
 </file>
 
 <file path=ppt/slides/slide12.xml><?xml version="1.0" encoding="utf-8"?>
+<p:sld xmlns:a="http://schemas.openxmlformats.org/drawingml/2006/main" xmlns:r="http://schemas.openxmlformats.org/officeDocument/2006/relationships" xmlns:p="http://schemas.openxmlformats.org/presentationml/2006/main">
+  <p:cSld>
+    <p:spTree>
+      <p:nvGrpSpPr>
+        <p:cNvPr id="1" name=""/>
+        <p:cNvGrpSpPr/>
+        <p:nvPr/>
+      </p:nvGrpSpPr>
+      <p:grpSpPr>
+        <a:xfrm>
+          <a:off x="0" y="0"/>
+          <a:ext cx="0" cy="0"/>
+          <a:chOff x="0" y="0"/>
+          <a:chExt cx="0" cy="0"/>
+        </a:xfrm>
+      </p:grpSpPr>
+      <p:sp>
+        <p:nvSpPr>
+          <p:cNvPr id="2" name="제목 1">
+            <a:extLst>
+              <a:ext uri="{FF2B5EF4-FFF2-40B4-BE49-F238E27FC236}">
+                <a16:creationId xmlns:a16="http://schemas.microsoft.com/office/drawing/2014/main" id="{260F90FB-FE33-02CB-3C30-932B9E853787}"/>
+              </a:ext>
+            </a:extLst>
+          </p:cNvPr>
+          <p:cNvSpPr>
+            <a:spLocks noGrp="1"/>
+          </p:cNvSpPr>
+          <p:nvPr>
+            <p:ph type="title"/>
+          </p:nvPr>
+        </p:nvSpPr>
+        <p:spPr/>
+        <p:txBody>
+          <a:bodyPr/>
+          <a:lstStyle/>
+          <a:p>
+            <a:r>
+              <a:rPr lang="ko-KR" altLang="en-US" dirty="0"/>
+              <a:t>입력 전류의 변화 </a:t>
+            </a:r>
+            <a:r>
+              <a:rPr lang="en-US" altLang="ko-KR" dirty="0"/>
+              <a:t>-</a:t>
+            </a:r>
+            <a:r>
+              <a:rPr lang="ko-KR" altLang="en-US" dirty="0"/>
+              <a:t> </a:t>
+            </a:r>
+            <a:r>
+              <a:rPr lang="en-US" altLang="ko-KR" dirty="0"/>
+              <a:t>input</a:t>
+            </a:r>
+            <a:endParaRPr kumimoji="1" lang="ko-KR" altLang="en-US" dirty="0"/>
+          </a:p>
+        </p:txBody>
+      </p:sp>
+      <mc:AlternateContent xmlns:mc="http://schemas.openxmlformats.org/markup-compatibility/2006">
+        <mc:Choice xmlns:a14="http://schemas.microsoft.com/office/drawing/2010/main" Requires="a14">
+          <p:sp>
+            <p:nvSpPr>
+              <p:cNvPr id="3" name="내용 개체 틀 2">
+                <a:extLst>
+                  <a:ext uri="{FF2B5EF4-FFF2-40B4-BE49-F238E27FC236}">
+                    <a16:creationId xmlns:a16="http://schemas.microsoft.com/office/drawing/2014/main" id="{1114E9FF-3AE3-F0F0-A3BB-961E1E437D1C}"/>
+                  </a:ext>
+                </a:extLst>
+              </p:cNvPr>
+              <p:cNvSpPr>
+                <a:spLocks noGrp="1"/>
+              </p:cNvSpPr>
+              <p:nvPr>
+                <p:ph idx="1"/>
+              </p:nvPr>
+            </p:nvSpPr>
+            <p:spPr>
+              <a:xfrm>
+                <a:off x="828675" y="2348880"/>
+                <a:ext cx="7991475" cy="3975720"/>
+              </a:xfrm>
+            </p:spPr>
+            <p:txBody>
+              <a:bodyPr>
+                <a:normAutofit/>
+              </a:bodyPr>
+              <a:lstStyle/>
+              <a:p>
+                <a14:m>
+                  <m:oMath xmlns:m="http://schemas.openxmlformats.org/officeDocument/2006/math">
+                    <m:sSub>
+                      <m:sSubPr>
+                        <m:ctrlPr>
+                          <a:rPr kumimoji="1" lang="en-US" altLang="ko-KR" sz="2400" i="1" smtClean="0">
+                            <a:latin typeface="Cambria Math" panose="02040503050406030204" pitchFamily="18" charset="0"/>
+                          </a:rPr>
+                        </m:ctrlPr>
+                      </m:sSubPr>
+                      <m:e>
+                        <m:r>
+                          <a:rPr kumimoji="1" lang="en-US" altLang="ko-KR" sz="2400" b="0" i="1" smtClean="0">
+                            <a:latin typeface="Cambria Math" panose="02040503050406030204" pitchFamily="18" charset="0"/>
+                          </a:rPr>
+                          <m:t>𝑇</m:t>
+                        </m:r>
+                      </m:e>
+                      <m:sub>
+                        <m:r>
+                          <a:rPr kumimoji="1" lang="en-US" altLang="ko-KR" sz="2400" b="0" i="1" smtClean="0">
+                            <a:latin typeface="Cambria Math" panose="02040503050406030204" pitchFamily="18" charset="0"/>
+                          </a:rPr>
+                          <m:t>𝑠𝑦𝑛</m:t>
+                        </m:r>
+                      </m:sub>
+                    </m:sSub>
+                  </m:oMath>
+                </a14:m>
+                <a:r>
+                  <a:rPr kumimoji="1" lang="ko-KR" altLang="en-US" sz="2400" dirty="0"/>
+                  <a:t> </a:t>
+                </a:r>
+                <a:r>
+                  <a:rPr kumimoji="1" lang="en-US" altLang="ko-KR" sz="2400" dirty="0"/>
+                  <a:t>: </a:t>
+                </a:r>
+                <a:r>
+                  <a:rPr kumimoji="1" lang="ko-KR" altLang="en-US" sz="2400" dirty="0"/>
+                  <a:t>시냅스 </a:t>
+                </a:r>
+                <a:r>
+                  <a:rPr kumimoji="1" lang="ko-KR" altLang="en-US" sz="2400" dirty="0" err="1"/>
+                  <a:t>붕괘</a:t>
+                </a:r>
+                <a:r>
+                  <a:rPr kumimoji="1" lang="ko-KR" altLang="en-US" sz="2400" dirty="0"/>
+                  <a:t> 상수</a:t>
+                </a:r>
+                <a:r>
+                  <a:rPr kumimoji="1" lang="en-US" altLang="ko-KR" sz="2400" dirty="0"/>
+                  <a:t>, </a:t>
+                </a:r>
+                <a:r>
+                  <a:rPr kumimoji="1" lang="ko-KR" altLang="en-US" sz="2400" dirty="0"/>
+                  <a:t>전류의 변화 속도를 조절</a:t>
+                </a:r>
+                <a:endParaRPr kumimoji="1" lang="en-US" altLang="ko-KR" sz="2400" dirty="0"/>
+              </a:p>
+              <a:p>
+                <a:pPr lvl="1"/>
+                <a:r>
+                  <a:rPr kumimoji="1" lang="ko-KR" altLang="en-US" sz="2000" dirty="0"/>
+                  <a:t>증가</a:t>
+                </a:r>
+                <a:r>
+                  <a:rPr kumimoji="1" lang="en-US" altLang="ko-KR" sz="2000" dirty="0"/>
+                  <a:t>: </a:t>
+                </a:r>
+                <a:r>
+                  <a:rPr kumimoji="1" lang="ko-KR" altLang="en-US" sz="2000" dirty="0"/>
+                  <a:t>전류 변화 속도 감소</a:t>
+                </a:r>
+                <a:endParaRPr kumimoji="1" lang="en-US" altLang="ko-KR" sz="2000" dirty="0"/>
+              </a:p>
+              <a:p>
+                <a:pPr lvl="1"/>
+                <a:r>
+                  <a:rPr kumimoji="1" lang="ko-KR" altLang="en-US" sz="2000" dirty="0"/>
+                  <a:t>감소</a:t>
+                </a:r>
+                <a:r>
+                  <a:rPr kumimoji="1" lang="en-US" altLang="ko-KR" sz="2000" dirty="0"/>
+                  <a:t>: </a:t>
+                </a:r>
+                <a:r>
+                  <a:rPr kumimoji="1" lang="ko-KR" altLang="en-US" sz="2000" dirty="0"/>
+                  <a:t>전류 변화 속도 증가</a:t>
+                </a:r>
+                <a:endParaRPr kumimoji="1" lang="en-US" altLang="ko-KR" sz="2000" dirty="0"/>
+              </a:p>
+              <a:p>
+                <a14:m>
+                  <m:oMath xmlns:m="http://schemas.openxmlformats.org/officeDocument/2006/math">
+                    <m:sSub>
+                      <m:sSubPr>
+                        <m:ctrlPr>
+                          <a:rPr kumimoji="1" lang="en-US" altLang="ko-KR" sz="2400" i="1" smtClean="0">
+                            <a:latin typeface="Cambria Math" panose="02040503050406030204" pitchFamily="18" charset="0"/>
+                          </a:rPr>
+                        </m:ctrlPr>
+                      </m:sSubPr>
+                      <m:e>
+                        <m:r>
+                          <a:rPr kumimoji="1" lang="en-US" altLang="ko-KR" sz="2400" b="0" i="1" smtClean="0">
+                            <a:latin typeface="Cambria Math" panose="02040503050406030204" pitchFamily="18" charset="0"/>
+                          </a:rPr>
+                          <m:t>𝐼</m:t>
+                        </m:r>
+                      </m:e>
+                      <m:sub>
+                        <m:r>
+                          <a:rPr kumimoji="1" lang="en-US" altLang="ko-KR" sz="2400" b="0" i="1" smtClean="0">
+                            <a:latin typeface="Cambria Math" panose="02040503050406030204" pitchFamily="18" charset="0"/>
+                          </a:rPr>
+                          <m:t>𝑖</m:t>
+                        </m:r>
+                      </m:sub>
+                    </m:sSub>
+                  </m:oMath>
+                </a14:m>
+                <a:r>
+                  <a:rPr kumimoji="1" lang="ko-KR" altLang="en-US" sz="2400" dirty="0"/>
+                  <a:t> </a:t>
+                </a:r>
+                <a:r>
+                  <a:rPr kumimoji="1" lang="en-US" altLang="ko-KR" sz="2400" dirty="0"/>
+                  <a:t>: </a:t>
+                </a:r>
+                <a:r>
+                  <a:rPr kumimoji="1" lang="ko-KR" altLang="en-US" sz="2400" dirty="0"/>
+                  <a:t>입력전류</a:t>
+                </a:r>
+                <a:endParaRPr kumimoji="1" lang="en-US" altLang="ko-KR" sz="2400" dirty="0"/>
+              </a:p>
+              <a:p>
+                <a14:m>
+                  <m:oMath xmlns:m="http://schemas.openxmlformats.org/officeDocument/2006/math">
+                    <m:sSubSup>
+                      <m:sSubSupPr>
+                        <m:ctrlPr>
+                          <a:rPr kumimoji="1" lang="en-US" altLang="ko-KR" sz="2400" i="1" smtClean="0">
+                            <a:latin typeface="Cambria Math" panose="02040503050406030204" pitchFamily="18" charset="0"/>
+                          </a:rPr>
+                        </m:ctrlPr>
+                      </m:sSubSupPr>
+                      <m:e>
+                        <m:r>
+                          <a:rPr kumimoji="1" lang="en-US" altLang="ko-KR" sz="2400" b="0" i="1" smtClean="0">
+                            <a:latin typeface="Cambria Math" panose="02040503050406030204" pitchFamily="18" charset="0"/>
+                          </a:rPr>
+                          <m:t>𝑆</m:t>
+                        </m:r>
+                      </m:e>
+                      <m:sub>
+                        <m:r>
+                          <a:rPr kumimoji="1" lang="en-US" altLang="ko-KR" sz="2400" b="0" i="1" smtClean="0">
+                            <a:latin typeface="Cambria Math" panose="02040503050406030204" pitchFamily="18" charset="0"/>
+                          </a:rPr>
+                          <m:t>𝑗</m:t>
+                        </m:r>
+                      </m:sub>
+                      <m:sup>
+                        <m:d>
+                          <m:dPr>
+                            <m:ctrlPr>
+                              <a:rPr kumimoji="1" lang="en-US" altLang="ko-KR" sz="2400" b="0" i="1" smtClean="0">
+                                <a:latin typeface="Cambria Math" panose="02040503050406030204" pitchFamily="18" charset="0"/>
+                              </a:rPr>
+                            </m:ctrlPr>
+                          </m:dPr>
+                          <m:e>
+                            <m:r>
+                              <a:rPr kumimoji="1" lang="en-US" altLang="ko-KR" sz="2400" b="0" i="1" smtClean="0">
+                                <a:latin typeface="Cambria Math" panose="02040503050406030204" pitchFamily="18" charset="0"/>
+                              </a:rPr>
+                              <m:t>𝑙</m:t>
+                            </m:r>
+                          </m:e>
+                        </m:d>
+                      </m:sup>
+                    </m:sSubSup>
+                    <m:r>
+                      <a:rPr kumimoji="1" lang="en-US" altLang="ko-KR" sz="2400" b="0" i="1" smtClean="0">
+                        <a:latin typeface="Cambria Math" panose="02040503050406030204" pitchFamily="18" charset="0"/>
+                      </a:rPr>
+                      <m:t>(</m:t>
+                    </m:r>
+                    <m:r>
+                      <a:rPr kumimoji="1" lang="en-US" altLang="ko-KR" sz="2400" b="0" i="1" smtClean="0">
+                        <a:latin typeface="Cambria Math" panose="02040503050406030204" pitchFamily="18" charset="0"/>
+                      </a:rPr>
+                      <m:t>𝑡</m:t>
+                    </m:r>
+                    <m:r>
+                      <a:rPr kumimoji="1" lang="en-US" altLang="ko-KR" sz="2400" b="0" i="1" smtClean="0">
+                        <a:latin typeface="Cambria Math" panose="02040503050406030204" pitchFamily="18" charset="0"/>
+                      </a:rPr>
+                      <m:t>)</m:t>
+                    </m:r>
+                  </m:oMath>
+                </a14:m>
+                <a:r>
+                  <a:rPr kumimoji="1" lang="ko-KR" altLang="en-US" sz="2400" dirty="0"/>
+                  <a:t> </a:t>
+                </a:r>
+                <a:r>
+                  <a:rPr kumimoji="1" lang="en-US" altLang="ko-KR" sz="2400" dirty="0"/>
+                  <a:t>: </a:t>
+                </a:r>
+                <a:r>
+                  <a:rPr kumimoji="1" lang="ko-KR" altLang="en-US" sz="2400" dirty="0"/>
+                  <a:t>스파이크 발생에 대한 수식 </a:t>
+                </a:r>
+                <a:r>
+                  <a:rPr kumimoji="1" lang="en-US" altLang="ko-KR" sz="2400" dirty="0"/>
+                  <a:t>– reset</a:t>
+                </a:r>
+              </a:p>
+              <a:p>
+                <a:pPr lvl="1"/>
+                <a:r>
+                  <a:rPr kumimoji="1" lang="en-US" altLang="ko-KR" sz="2000" dirty="0"/>
+                  <a:t>*</a:t>
+                </a:r>
+                <a:r>
+                  <a:rPr kumimoji="1" lang="ko-KR" altLang="en-US" sz="2000" dirty="0"/>
+                  <a:t>스파이크 발생시 </a:t>
+                </a:r>
+                <a:r>
+                  <a:rPr kumimoji="1" lang="en-US" altLang="ko-KR" sz="2000" dirty="0"/>
+                  <a:t>1, </a:t>
+                </a:r>
+                <a:r>
+                  <a:rPr kumimoji="1" lang="ko-KR" altLang="en-US" sz="2000" dirty="0"/>
+                  <a:t>아니면 </a:t>
+                </a:r>
+                <a:r>
+                  <a:rPr kumimoji="1" lang="en-US" altLang="ko-KR" sz="2000" dirty="0"/>
+                  <a:t>0</a:t>
+                </a:r>
+                <a:endParaRPr kumimoji="1" lang="ko-KR" altLang="en-US" sz="2000" dirty="0"/>
+              </a:p>
+            </p:txBody>
+          </p:sp>
+        </mc:Choice>
+        <mc:Fallback>
+          <p:sp>
+            <p:nvSpPr>
+              <p:cNvPr id="3" name="내용 개체 틀 2">
+                <a:extLst>
+                  <a:ext uri="{FF2B5EF4-FFF2-40B4-BE49-F238E27FC236}">
+                    <a16:creationId xmlns:a16="http://schemas.microsoft.com/office/drawing/2014/main" id="{1114E9FF-3AE3-F0F0-A3BB-961E1E437D1C}"/>
+                  </a:ext>
+                </a:extLst>
+              </p:cNvPr>
+              <p:cNvSpPr>
+                <a:spLocks noGrp="1" noRot="1" noChangeAspect="1" noMove="1" noResize="1" noEditPoints="1" noAdjustHandles="1" noChangeArrowheads="1" noChangeShapeType="1" noTextEdit="1"/>
+              </p:cNvSpPr>
+              <p:nvPr>
+                <p:ph idx="1"/>
+              </p:nvPr>
+            </p:nvSpPr>
+            <p:spPr>
+              <a:xfrm>
+                <a:off x="828675" y="2348880"/>
+                <a:ext cx="7991475" cy="3975720"/>
+              </a:xfrm>
+              <a:blipFill>
+                <a:blip r:embed="rId2"/>
+                <a:stretch>
+                  <a:fillRect l="-610" t="-1685"/>
+                </a:stretch>
+              </a:blipFill>
+            </p:spPr>
+            <p:txBody>
+              <a:bodyPr/>
+              <a:lstStyle/>
+              <a:p>
+                <a:r>
+                  <a:rPr lang="ko-KR" altLang="en-US">
+                    <a:noFill/>
+                  </a:rPr>
+                  <a:t> </a:t>
+                </a:r>
+              </a:p>
+            </p:txBody>
+          </p:sp>
+        </mc:Fallback>
+      </mc:AlternateContent>
+      <p:pic>
+        <p:nvPicPr>
+          <p:cNvPr id="5" name="그림 4">
+            <a:extLst>
+              <a:ext uri="{FF2B5EF4-FFF2-40B4-BE49-F238E27FC236}">
+                <a16:creationId xmlns:a16="http://schemas.microsoft.com/office/drawing/2014/main" id="{02646FBA-E62C-141A-BE5C-C2D05FE48EAE}"/>
+              </a:ext>
+            </a:extLst>
+          </p:cNvPr>
+          <p:cNvPicPr>
+            <a:picLocks noChangeAspect="1"/>
+          </p:cNvPicPr>
+          <p:nvPr/>
+        </p:nvPicPr>
+        <p:blipFill>
+          <a:blip r:embed="rId3"/>
+          <a:stretch>
+            <a:fillRect/>
+          </a:stretch>
+        </p:blipFill>
+        <p:spPr>
+          <a:xfrm>
+            <a:off x="828674" y="1052736"/>
+            <a:ext cx="6218335" cy="1152128"/>
+          </a:xfrm>
+          <a:prstGeom prst="rect">
+            <a:avLst/>
+          </a:prstGeom>
+        </p:spPr>
+      </p:pic>
+    </p:spTree>
+    <p:extLst>
+      <p:ext uri="{BB962C8B-B14F-4D97-AF65-F5344CB8AC3E}">
+        <p14:creationId xmlns:p14="http://schemas.microsoft.com/office/powerpoint/2010/main" val="2222831953"/>
+      </p:ext>
+    </p:extLst>
+  </p:cSld>
+  <p:clrMapOvr>
+    <a:masterClrMapping/>
+  </p:clrMapOvr>
+</p:sld>
+</file>
+
+<file path=ppt/slides/slide13.xml><?xml version="1.0" encoding="utf-8"?>
+<p:sld xmlns:a="http://schemas.openxmlformats.org/drawingml/2006/main" xmlns:r="http://schemas.openxmlformats.org/officeDocument/2006/relationships" xmlns:p="http://schemas.openxmlformats.org/presentationml/2006/main">
+  <p:cSld>
+    <p:spTree>
+      <p:nvGrpSpPr>
+        <p:cNvPr id="1" name=""/>
+        <p:cNvGrpSpPr/>
+        <p:nvPr/>
+      </p:nvGrpSpPr>
+      <p:grpSpPr>
+        <a:xfrm>
+          <a:off x="0" y="0"/>
+          <a:ext cx="0" cy="0"/>
+          <a:chOff x="0" y="0"/>
+          <a:chExt cx="0" cy="0"/>
+        </a:xfrm>
+      </p:grpSpPr>
+      <p:sp>
+        <p:nvSpPr>
+          <p:cNvPr id="2" name="제목 1">
+            <a:extLst>
+              <a:ext uri="{FF2B5EF4-FFF2-40B4-BE49-F238E27FC236}">
+                <a16:creationId xmlns:a16="http://schemas.microsoft.com/office/drawing/2014/main" id="{F51CC236-9026-D4E3-911C-892C3AF0BD44}"/>
+              </a:ext>
+            </a:extLst>
+          </p:cNvPr>
+          <p:cNvSpPr>
+            <a:spLocks noGrp="1"/>
+          </p:cNvSpPr>
+          <p:nvPr>
+            <p:ph type="title"/>
+          </p:nvPr>
+        </p:nvSpPr>
+        <p:spPr/>
+        <p:txBody>
+          <a:bodyPr/>
+          <a:lstStyle/>
+          <a:p>
+            <a:r>
+              <a:rPr kumimoji="1" lang="ko-KR" altLang="en-US" sz="2800" dirty="0"/>
+              <a:t>이산시간으로 표현된 </a:t>
+            </a:r>
+            <a:r>
+              <a:rPr kumimoji="1" lang="en-US" altLang="ko-KR" sz="2800" dirty="0"/>
+              <a:t>RNN </a:t>
+            </a:r>
+            <a:r>
+              <a:rPr kumimoji="1" lang="ko-KR" altLang="en-US" sz="2800" dirty="0"/>
+              <a:t>방정식 </a:t>
+            </a:r>
+            <a:r>
+              <a:rPr kumimoji="1" lang="en-US" altLang="ko-KR" sz="2800" dirty="0"/>
+              <a:t>-</a:t>
+            </a:r>
+            <a:r>
+              <a:rPr kumimoji="1" lang="ko-KR" altLang="en-US" sz="2800" dirty="0"/>
+              <a:t> </a:t>
+            </a:r>
+            <a:r>
+              <a:rPr kumimoji="1" lang="en-US" altLang="ko-KR" sz="2800" dirty="0"/>
+              <a:t>reset</a:t>
+            </a:r>
+            <a:endParaRPr lang="ko-KR" altLang="en-US" sz="2800" dirty="0"/>
+          </a:p>
+        </p:txBody>
+      </p:sp>
+      <mc:AlternateContent xmlns:mc="http://schemas.openxmlformats.org/markup-compatibility/2006">
+        <mc:Choice xmlns:a14="http://schemas.microsoft.com/office/drawing/2010/main" Requires="a14">
+          <p:sp>
+            <p:nvSpPr>
+              <p:cNvPr id="3" name="내용 개체 틀 2">
+                <a:extLst>
+                  <a:ext uri="{FF2B5EF4-FFF2-40B4-BE49-F238E27FC236}">
+                    <a16:creationId xmlns:a16="http://schemas.microsoft.com/office/drawing/2014/main" id="{1D743593-A5DF-9BB9-D0F2-4E8D21BD24E2}"/>
+                  </a:ext>
+                </a:extLst>
+              </p:cNvPr>
+              <p:cNvSpPr>
+                <a:spLocks noGrp="1"/>
+              </p:cNvSpPr>
+              <p:nvPr>
+                <p:ph idx="1"/>
+              </p:nvPr>
+            </p:nvSpPr>
+            <p:spPr>
+              <a:xfrm>
+                <a:off x="755651" y="3501008"/>
+                <a:ext cx="8064500" cy="2823592"/>
+              </a:xfrm>
+            </p:spPr>
+            <p:txBody>
+              <a:bodyPr/>
+              <a:lstStyle/>
+              <a:p>
+                <a:r>
+                  <a:rPr lang="en-US" altLang="ko-KR" dirty="0"/>
+                  <a:t>RNN</a:t>
+                </a:r>
+                <a:r>
+                  <a:rPr lang="ko-KR" altLang="en-US" dirty="0"/>
+                  <a:t>으로 구현을 위해 이산 시간으로 표현</a:t>
+                </a:r>
+                <a:endParaRPr lang="en-US" altLang="ko-KR" dirty="0"/>
+              </a:p>
+              <a:p>
+                <a:pPr lvl="1"/>
+                <a:r>
+                  <a:rPr lang="ko-KR" altLang="en-US" dirty="0"/>
+                  <a:t>이산 시간이란</a:t>
+                </a:r>
+                <a:r>
+                  <a:rPr lang="en-US" altLang="ko-KR" dirty="0"/>
+                  <a:t>?</a:t>
+                </a:r>
+              </a:p>
+              <a:p>
+                <a:pPr lvl="2"/>
+                <a:r>
+                  <a:rPr lang="ko-KR" altLang="en-US" dirty="0"/>
+                  <a:t>연속적이지 않은 일정한 간격의 시간</a:t>
+                </a:r>
+                <a:endParaRPr lang="en-US" altLang="ko-KR" dirty="0"/>
+              </a:p>
+              <a:p>
+                <a:pPr lvl="2"/>
+                <a:endParaRPr lang="en-US" altLang="ko-KR" dirty="0"/>
+              </a:p>
+              <a:p>
+                <a:r>
+                  <a:rPr lang="ko-KR" altLang="en-US" dirty="0"/>
+                  <a:t>스파이크의 비선형 특성을 강조하기 위한 설정</a:t>
+                </a:r>
+                <a:endParaRPr lang="en-US" altLang="ko-KR" dirty="0"/>
+              </a:p>
+              <a:p>
+                <a:pPr lvl="1"/>
+                <a14:m>
+                  <m:oMath xmlns:m="http://schemas.openxmlformats.org/officeDocument/2006/math">
+                    <m:sSub>
+                      <m:sSubPr>
+                        <m:ctrlPr>
+                          <a:rPr lang="en-US" altLang="ko-KR" i="1" smtClean="0">
+                            <a:latin typeface="Cambria Math" panose="02040503050406030204" pitchFamily="18" charset="0"/>
+                          </a:rPr>
+                        </m:ctrlPr>
+                      </m:sSubPr>
+                      <m:e>
+                        <m:r>
+                          <a:rPr lang="en-US" altLang="ko-KR" b="0" i="1" smtClean="0">
+                            <a:latin typeface="Cambria Math" panose="02040503050406030204" pitchFamily="18" charset="0"/>
+                          </a:rPr>
+                          <m:t>𝑈</m:t>
+                        </m:r>
+                      </m:e>
+                      <m:sub>
+                        <m:r>
+                          <a:rPr lang="en-US" altLang="ko-KR" b="0" i="1" smtClean="0">
+                            <a:latin typeface="Cambria Math" panose="02040503050406030204" pitchFamily="18" charset="0"/>
+                          </a:rPr>
+                          <m:t>𝑟𝑠𝑒𝑡</m:t>
+                        </m:r>
+                      </m:sub>
+                    </m:sSub>
+                  </m:oMath>
+                </a14:m>
+                <a:r>
+                  <a:rPr lang="en-US" altLang="ko-KR" dirty="0"/>
+                  <a:t>(</a:t>
+                </a:r>
+                <a:r>
+                  <a:rPr lang="ko-KR" altLang="en-US" dirty="0" err="1"/>
+                  <a:t>리셋전위</a:t>
+                </a:r>
+                <a:r>
+                  <a:rPr lang="en-US" altLang="ko-KR" dirty="0"/>
+                  <a:t>), </a:t>
+                </a:r>
+                <a14:m>
+                  <m:oMath xmlns:m="http://schemas.openxmlformats.org/officeDocument/2006/math">
+                    <m:r>
+                      <a:rPr lang="en-US" altLang="ko-KR" i="1">
+                        <a:latin typeface="Cambria Math" panose="02040503050406030204" pitchFamily="18" charset="0"/>
+                      </a:rPr>
+                      <m:t>𝑅</m:t>
+                    </m:r>
+                  </m:oMath>
+                </a14:m>
+                <a:r>
+                  <a:rPr lang="en-US" altLang="ko-KR" dirty="0"/>
+                  <a:t>(</a:t>
+                </a:r>
+                <a:r>
+                  <a:rPr lang="ko-KR" altLang="en-US" dirty="0"/>
+                  <a:t>저항</a:t>
+                </a:r>
+                <a:r>
+                  <a:rPr lang="en-US" altLang="ko-KR" dirty="0"/>
+                  <a:t>), </a:t>
+                </a:r>
+                <a14:m>
+                  <m:oMath xmlns:m="http://schemas.openxmlformats.org/officeDocument/2006/math">
+                    <m:r>
+                      <a:rPr lang="en-US" altLang="ko-KR" i="1">
+                        <a:latin typeface="Cambria Math" panose="02040503050406030204" pitchFamily="18" charset="0"/>
+                      </a:rPr>
+                      <m:t>𝑣</m:t>
+                    </m:r>
+                  </m:oMath>
+                </a14:m>
+                <a:r>
+                  <a:rPr lang="en-US" altLang="ko-KR" dirty="0"/>
+                  <a:t>(</a:t>
+                </a:r>
+                <a:r>
+                  <a:rPr lang="ko-KR" altLang="en-US" dirty="0"/>
+                  <a:t>발화 </a:t>
+                </a:r>
+                <a:r>
+                  <a:rPr lang="ko-KR" altLang="en-US" dirty="0" err="1"/>
+                  <a:t>임계값</a:t>
+                </a:r>
+                <a:r>
+                  <a:rPr lang="en-US" altLang="ko-KR" dirty="0"/>
+                  <a:t>) </a:t>
+                </a:r>
+                <a:r>
+                  <a:rPr lang="ko-KR" altLang="en-US" dirty="0"/>
+                  <a:t>설정</a:t>
+                </a:r>
+              </a:p>
+            </p:txBody>
+          </p:sp>
+        </mc:Choice>
+        <mc:Fallback>
+          <p:sp>
+            <p:nvSpPr>
+              <p:cNvPr id="3" name="내용 개체 틀 2">
+                <a:extLst>
+                  <a:ext uri="{FF2B5EF4-FFF2-40B4-BE49-F238E27FC236}">
+                    <a16:creationId xmlns:a16="http://schemas.microsoft.com/office/drawing/2014/main" id="{1D743593-A5DF-9BB9-D0F2-4E8D21BD24E2}"/>
+                  </a:ext>
+                </a:extLst>
+              </p:cNvPr>
+              <p:cNvSpPr>
+                <a:spLocks noGrp="1" noRot="1" noChangeAspect="1" noMove="1" noResize="1" noEditPoints="1" noAdjustHandles="1" noChangeArrowheads="1" noChangeShapeType="1" noTextEdit="1"/>
+              </p:cNvSpPr>
+              <p:nvPr>
+                <p:ph idx="1"/>
+              </p:nvPr>
+            </p:nvSpPr>
+            <p:spPr>
+              <a:xfrm>
+                <a:off x="755651" y="3501008"/>
+                <a:ext cx="8064500" cy="2823592"/>
+              </a:xfrm>
+              <a:blipFill>
+                <a:blip r:embed="rId2"/>
+                <a:stretch>
+                  <a:fillRect l="-907" t="-2155"/>
+                </a:stretch>
+              </a:blipFill>
+            </p:spPr>
+            <p:txBody>
+              <a:bodyPr/>
+              <a:lstStyle/>
+              <a:p>
+                <a:r>
+                  <a:rPr lang="ko-KR" altLang="en-US">
+                    <a:noFill/>
+                  </a:rPr>
+                  <a:t> </a:t>
+                </a:r>
+              </a:p>
+            </p:txBody>
+          </p:sp>
+        </mc:Fallback>
+      </mc:AlternateContent>
+      <p:pic>
+        <p:nvPicPr>
+          <p:cNvPr id="4" name="내용 개체 틀 4" descr="폰트, 친필, 텍스트, 그래픽이(가) 표시된 사진&#10;&#10;자동 생성된 설명">
+            <a:extLst>
+              <a:ext uri="{FF2B5EF4-FFF2-40B4-BE49-F238E27FC236}">
+                <a16:creationId xmlns:a16="http://schemas.microsoft.com/office/drawing/2014/main" id="{44073FA6-5F65-02DC-CE52-7AB189A64202}"/>
+              </a:ext>
+            </a:extLst>
+          </p:cNvPr>
+          <p:cNvPicPr>
+            <a:picLocks noChangeAspect="1"/>
+          </p:cNvPicPr>
+          <p:nvPr/>
+        </p:nvPicPr>
+        <p:blipFill>
+          <a:blip r:embed="rId3">
+            <a:extLst>
+              <a:ext uri="{28A0092B-C50C-407E-A947-70E740481C1C}">
+                <a14:useLocalDpi xmlns:a14="http://schemas.microsoft.com/office/drawing/2010/main" val="0"/>
+              </a:ext>
+            </a:extLst>
+          </a:blip>
+          <a:stretch>
+            <a:fillRect/>
+          </a:stretch>
+        </p:blipFill>
+        <p:spPr>
+          <a:xfrm>
+            <a:off x="755650" y="1124743"/>
+            <a:ext cx="3384302" cy="938691"/>
+          </a:xfrm>
+          <a:prstGeom prst="rect">
+            <a:avLst/>
+          </a:prstGeom>
+          <a:noFill/>
+          <a:ln w="9525">
+            <a:noFill/>
+            <a:miter/>
+          </a:ln>
+        </p:spPr>
+      </p:pic>
+      <p:pic>
+        <p:nvPicPr>
+          <p:cNvPr id="6" name="그림 5">
+            <a:extLst>
+              <a:ext uri="{FF2B5EF4-FFF2-40B4-BE49-F238E27FC236}">
+                <a16:creationId xmlns:a16="http://schemas.microsoft.com/office/drawing/2014/main" id="{5F88A92F-C5B0-087C-FE3C-FCECD72B0FB7}"/>
+              </a:ext>
+            </a:extLst>
+          </p:cNvPr>
+          <p:cNvPicPr>
+            <a:picLocks noChangeAspect="1"/>
+          </p:cNvPicPr>
+          <p:nvPr/>
+        </p:nvPicPr>
+        <p:blipFill>
+          <a:blip r:embed="rId4"/>
+          <a:stretch>
+            <a:fillRect/>
+          </a:stretch>
+        </p:blipFill>
+        <p:spPr>
+          <a:xfrm>
+            <a:off x="5402728" y="1124743"/>
+            <a:ext cx="3417423" cy="938691"/>
+          </a:xfrm>
+          <a:prstGeom prst="rect">
+            <a:avLst/>
+          </a:prstGeom>
+        </p:spPr>
+      </p:pic>
+      <p:sp>
+        <p:nvSpPr>
+          <p:cNvPr id="7" name="화살표: 오른쪽 6">
+            <a:extLst>
+              <a:ext uri="{FF2B5EF4-FFF2-40B4-BE49-F238E27FC236}">
+                <a16:creationId xmlns:a16="http://schemas.microsoft.com/office/drawing/2014/main" id="{DFF05ECA-D715-1315-A4D1-D2161236570A}"/>
+              </a:ext>
+            </a:extLst>
+          </p:cNvPr>
+          <p:cNvSpPr/>
+          <p:nvPr/>
+        </p:nvSpPr>
+        <p:spPr>
+          <a:xfrm>
+            <a:off x="4375296" y="1334553"/>
+            <a:ext cx="792088" cy="504056"/>
+          </a:xfrm>
+          <a:prstGeom prst="rightArrow">
+            <a:avLst/>
+          </a:prstGeom>
+          <a:solidFill>
+            <a:schemeClr val="tx1"/>
+          </a:solidFill>
+          <a:ln w="28575" cap="flat" cmpd="sng" algn="ctr">
+            <a:solidFill>
+              <a:schemeClr val="tx1"/>
+            </a:solidFill>
+            <a:prstDash val="solid"/>
+            <a:round/>
+          </a:ln>
+          <a:effectLst/>
+        </p:spPr>
+        <p:txBody>
+          <a:bodyPr vert="horz" wrap="none" lIns="91440" tIns="45720" rIns="91440" bIns="45720" numCol="1" rtlCol="0" anchor="ctr" anchorCtr="0" compatLnSpc="1">
+            <a:prstTxWarp prst="textNoShape">
+              <a:avLst/>
+            </a:prstTxWarp>
+            <a:spAutoFit/>
+          </a:bodyPr>
+          <a:lstStyle/>
+          <a:p>
+            <a:pPr marL="0" marR="0" indent="0" algn="ctr" defTabSz="914400" rtl="0" eaLnBrk="1" fontAlgn="base" latinLnBrk="1" hangingPunct="1">
+              <a:lnSpc>
+                <a:spcPct val="100000"/>
+              </a:lnSpc>
+              <a:spcBef>
+                <a:spcPct val="0"/>
+              </a:spcBef>
+              <a:spcAft>
+                <a:spcPct val="0"/>
+              </a:spcAft>
+              <a:buNone/>
+            </a:pPr>
+            <a:endParaRPr kumimoji="1" lang="ko-KR" altLang="en-US" sz="2400" i="0" u="none" strike="noStrike" normalizeH="0" baseline="0">
+              <a:latin typeface="Times New Roman"/>
+              <a:ea typeface="굴림"/>
+            </a:endParaRPr>
+          </a:p>
+        </p:txBody>
+      </p:sp>
+      <mc:AlternateContent xmlns:mc="http://schemas.openxmlformats.org/markup-compatibility/2006">
+        <mc:Choice xmlns:a14="http://schemas.microsoft.com/office/drawing/2010/main" Requires="a14">
+          <p:sp>
+            <p:nvSpPr>
+              <p:cNvPr id="8" name="TextBox 7">
+                <a:extLst>
+                  <a:ext uri="{FF2B5EF4-FFF2-40B4-BE49-F238E27FC236}">
+                    <a16:creationId xmlns:a16="http://schemas.microsoft.com/office/drawing/2014/main" id="{22716922-FB06-9870-626E-46D6EABBB495}"/>
+                  </a:ext>
+                </a:extLst>
+              </p:cNvPr>
+              <p:cNvSpPr txBox="1"/>
+              <p:nvPr/>
+            </p:nvSpPr>
+            <p:spPr>
+              <a:xfrm>
+                <a:off x="7512677" y="2115811"/>
+                <a:ext cx="1307474" cy="1107996"/>
+              </a:xfrm>
+              <a:prstGeom prst="rect">
+                <a:avLst/>
+              </a:prstGeom>
+              <a:noFill/>
+              <a:ln w="28575">
+                <a:solidFill>
+                  <a:schemeClr val="tx1"/>
+                </a:solidFill>
+              </a:ln>
+            </p:spPr>
+            <p:txBody>
+              <a:bodyPr wrap="none" lIns="0" tIns="0" rIns="0" bIns="0" rtlCol="0">
+                <a:spAutoFit/>
+              </a:bodyPr>
+              <a:lstStyle/>
+              <a:p>
+                <a:pPr algn="just"/>
+                <a14:m>
+                  <m:oMathPara xmlns:m="http://schemas.openxmlformats.org/officeDocument/2006/math">
+                    <m:oMathParaPr>
+                      <m:jc m:val="centerGroup"/>
+                    </m:oMathParaPr>
+                    <m:oMath xmlns:m="http://schemas.openxmlformats.org/officeDocument/2006/math">
+                      <m:sSub>
+                        <m:sSubPr>
+                          <m:ctrlPr>
+                            <a:rPr lang="en-US" altLang="ko-KR" i="1" smtClean="0">
+                              <a:latin typeface="Cambria Math" panose="02040503050406030204" pitchFamily="18" charset="0"/>
+                            </a:rPr>
+                          </m:ctrlPr>
+                        </m:sSubPr>
+                        <m:e>
+                          <m:r>
+                            <a:rPr lang="en-US" altLang="ko-KR" b="0" i="1" smtClean="0">
+                              <a:latin typeface="Cambria Math" panose="02040503050406030204" pitchFamily="18" charset="0"/>
+                            </a:rPr>
+                            <m:t>𝑈</m:t>
+                          </m:r>
+                        </m:e>
+                        <m:sub>
+                          <m:r>
+                            <a:rPr lang="en-US" altLang="ko-KR" b="0" i="1" smtClean="0">
+                              <a:latin typeface="Cambria Math" panose="02040503050406030204" pitchFamily="18" charset="0"/>
+                            </a:rPr>
+                            <m:t>𝑟𝑠𝑒𝑡</m:t>
+                          </m:r>
+                        </m:sub>
+                      </m:sSub>
+                      <m:r>
+                        <a:rPr lang="en-US" altLang="ko-KR" b="0" i="0" smtClean="0">
+                          <a:latin typeface="Cambria Math" panose="02040503050406030204" pitchFamily="18" charset="0"/>
+                        </a:rPr>
+                        <m:t>=0</m:t>
+                      </m:r>
+                    </m:oMath>
+                  </m:oMathPara>
+                </a14:m>
+                <a:endParaRPr lang="en-US" altLang="ko-KR" b="0" dirty="0"/>
+              </a:p>
+              <a:p>
+                <a:pPr algn="just"/>
+                <a14:m>
+                  <m:oMathPara xmlns:m="http://schemas.openxmlformats.org/officeDocument/2006/math">
+                    <m:oMathParaPr>
+                      <m:jc m:val="centerGroup"/>
+                    </m:oMathParaPr>
+                    <m:oMath xmlns:m="http://schemas.openxmlformats.org/officeDocument/2006/math">
+                      <m:r>
+                        <a:rPr lang="en-US" altLang="ko-KR" b="0" i="1" smtClean="0">
+                          <a:latin typeface="Cambria Math" panose="02040503050406030204" pitchFamily="18" charset="0"/>
+                        </a:rPr>
+                        <m:t>𝑅</m:t>
+                      </m:r>
+                      <m:r>
+                        <a:rPr lang="en-US" altLang="ko-KR" b="0" i="1" smtClean="0">
+                          <a:latin typeface="Cambria Math" panose="02040503050406030204" pitchFamily="18" charset="0"/>
+                        </a:rPr>
+                        <m:t>=1</m:t>
+                      </m:r>
+                    </m:oMath>
+                  </m:oMathPara>
+                </a14:m>
+                <a:endParaRPr lang="en-US" altLang="ko-KR" b="0" dirty="0"/>
+              </a:p>
+              <a:p>
+                <a:pPr algn="just"/>
+                <a14:m>
+                  <m:oMathPara xmlns:m="http://schemas.openxmlformats.org/officeDocument/2006/math">
+                    <m:oMathParaPr>
+                      <m:jc m:val="centerGroup"/>
+                    </m:oMathParaPr>
+                    <m:oMath xmlns:m="http://schemas.openxmlformats.org/officeDocument/2006/math">
+                      <m:r>
+                        <a:rPr lang="en-US" altLang="ko-KR" b="0" i="1" smtClean="0">
+                          <a:latin typeface="Cambria Math" panose="02040503050406030204" pitchFamily="18" charset="0"/>
+                        </a:rPr>
+                        <m:t>𝑣</m:t>
+                      </m:r>
+                      <m:r>
+                        <a:rPr lang="en-US" altLang="ko-KR" b="0" i="1" smtClean="0">
+                          <a:latin typeface="Cambria Math" panose="02040503050406030204" pitchFamily="18" charset="0"/>
+                        </a:rPr>
+                        <m:t>=1</m:t>
+                      </m:r>
+                    </m:oMath>
+                  </m:oMathPara>
+                </a14:m>
+                <a:endParaRPr lang="ko-KR" altLang="en-US" dirty="0"/>
+              </a:p>
+            </p:txBody>
+          </p:sp>
+        </mc:Choice>
+        <mc:Fallback>
+          <p:sp>
+            <p:nvSpPr>
+              <p:cNvPr id="8" name="TextBox 7">
+                <a:extLst>
+                  <a:ext uri="{FF2B5EF4-FFF2-40B4-BE49-F238E27FC236}">
+                    <a16:creationId xmlns:a16="http://schemas.microsoft.com/office/drawing/2014/main" id="{22716922-FB06-9870-626E-46D6EABBB495}"/>
+                  </a:ext>
+                </a:extLst>
+              </p:cNvPr>
+              <p:cNvSpPr txBox="1">
+                <a:spLocks noRot="1" noChangeAspect="1" noMove="1" noResize="1" noEditPoints="1" noAdjustHandles="1" noChangeArrowheads="1" noChangeShapeType="1" noTextEdit="1"/>
+              </p:cNvSpPr>
+              <p:nvPr/>
+            </p:nvSpPr>
+            <p:spPr>
+              <a:xfrm>
+                <a:off x="7512677" y="2115811"/>
+                <a:ext cx="1307474" cy="1107996"/>
+              </a:xfrm>
+              <a:prstGeom prst="rect">
+                <a:avLst/>
+              </a:prstGeom>
+              <a:blipFill>
+                <a:blip r:embed="rId5"/>
+                <a:stretch>
+                  <a:fillRect l="-3636" r="-3636" b="-535"/>
+                </a:stretch>
+              </a:blipFill>
+              <a:ln w="28575">
+                <a:solidFill>
+                  <a:schemeClr val="tx1"/>
+                </a:solidFill>
+              </a:ln>
+            </p:spPr>
+            <p:txBody>
+              <a:bodyPr/>
+              <a:lstStyle/>
+              <a:p>
+                <a:r>
+                  <a:rPr lang="ko-KR" altLang="en-US">
+                    <a:noFill/>
+                  </a:rPr>
+                  <a:t> </a:t>
+                </a:r>
+              </a:p>
+            </p:txBody>
+          </p:sp>
+        </mc:Fallback>
+      </mc:AlternateContent>
+      <p:cxnSp>
+        <p:nvCxnSpPr>
+          <p:cNvPr id="10" name="직선 화살표 연결선 9">
+            <a:extLst>
+              <a:ext uri="{FF2B5EF4-FFF2-40B4-BE49-F238E27FC236}">
+                <a16:creationId xmlns:a16="http://schemas.microsoft.com/office/drawing/2014/main" id="{E41091D1-31BD-13E7-FFD5-F7C810C57CD7}"/>
+              </a:ext>
+            </a:extLst>
+          </p:cNvPr>
+          <p:cNvCxnSpPr>
+            <a:endCxn id="8" idx="1"/>
+          </p:cNvCxnSpPr>
+          <p:nvPr/>
+        </p:nvCxnSpPr>
+        <p:spPr>
+          <a:xfrm flipV="1">
+            <a:off x="6372200" y="2669809"/>
+            <a:ext cx="1140477" cy="111119"/>
+          </a:xfrm>
+          <a:prstGeom prst="straightConnector1">
+            <a:avLst/>
+          </a:prstGeom>
+          <a:solidFill>
+            <a:schemeClr val="accent1"/>
+          </a:solidFill>
+          <a:ln w="28575" cap="flat" cmpd="sng" algn="ctr">
+            <a:solidFill>
+              <a:schemeClr val="tx1"/>
+            </a:solidFill>
+            <a:prstDash val="solid"/>
+            <a:round/>
+            <a:tailEnd type="triangle"/>
+          </a:ln>
+          <a:effectLst/>
+        </p:spPr>
+      </p:cxnSp>
+      <p:sp>
+        <p:nvSpPr>
+          <p:cNvPr id="11" name="TextBox 10">
+            <a:extLst>
+              <a:ext uri="{FF2B5EF4-FFF2-40B4-BE49-F238E27FC236}">
+                <a16:creationId xmlns:a16="http://schemas.microsoft.com/office/drawing/2014/main" id="{ADB98CEB-967F-A06E-4DBC-AB06974941E1}"/>
+              </a:ext>
+            </a:extLst>
+          </p:cNvPr>
+          <p:cNvSpPr txBox="1"/>
+          <p:nvPr/>
+        </p:nvSpPr>
+        <p:spPr>
+          <a:xfrm>
+            <a:off x="4225458" y="2457762"/>
+            <a:ext cx="2146742" cy="646331"/>
+          </a:xfrm>
+          <a:prstGeom prst="rect">
+            <a:avLst/>
+          </a:prstGeom>
+          <a:noFill/>
+        </p:spPr>
+        <p:txBody>
+          <a:bodyPr wrap="none" rtlCol="0">
+            <a:spAutoFit/>
+          </a:bodyPr>
+          <a:lstStyle/>
+          <a:p>
+            <a:r>
+              <a:rPr lang="ko-KR" altLang="en-US" sz="1800" dirty="0"/>
+              <a:t>물리적 단위로 값이</a:t>
+            </a:r>
+            <a:br>
+              <a:rPr lang="en-US" altLang="ko-KR" sz="1800" dirty="0"/>
+            </a:br>
+            <a:r>
+              <a:rPr lang="ko-KR" altLang="en-US" sz="1800" dirty="0"/>
+              <a:t>조정될 수 있음</a:t>
+            </a:r>
+          </a:p>
+        </p:txBody>
+      </p:sp>
+    </p:spTree>
+    <p:extLst>
+      <p:ext uri="{BB962C8B-B14F-4D97-AF65-F5344CB8AC3E}">
+        <p14:creationId xmlns:p14="http://schemas.microsoft.com/office/powerpoint/2010/main" val="4078367415"/>
+      </p:ext>
+    </p:extLst>
+  </p:cSld>
+  <p:clrMapOvr>
+    <a:masterClrMapping/>
+  </p:clrMapOvr>
+</p:sld>
+</file>
+
+<file path=ppt/slides/slide14.xml><?xml version="1.0" encoding="utf-8"?>
+<p:sld xmlns:a="http://schemas.openxmlformats.org/drawingml/2006/main" xmlns:r="http://schemas.openxmlformats.org/officeDocument/2006/relationships" xmlns:p="http://schemas.openxmlformats.org/presentationml/2006/main">
+  <p:cSld>
+    <p:spTree>
+      <p:nvGrpSpPr>
+        <p:cNvPr id="1" name=""/>
+        <p:cNvGrpSpPr/>
+        <p:nvPr/>
+      </p:nvGrpSpPr>
+      <p:grpSpPr>
+        <a:xfrm>
+          <a:off x="0" y="0"/>
+          <a:ext cx="0" cy="0"/>
+          <a:chOff x="0" y="0"/>
+          <a:chExt cx="0" cy="0"/>
+        </a:xfrm>
+      </p:grpSpPr>
+      <p:sp>
+        <p:nvSpPr>
+          <p:cNvPr id="2" name="제목 1">
+            <a:extLst>
+              <a:ext uri="{FF2B5EF4-FFF2-40B4-BE49-F238E27FC236}">
+                <a16:creationId xmlns:a16="http://schemas.microsoft.com/office/drawing/2014/main" id="{F51CC236-9026-D4E3-911C-892C3AF0BD44}"/>
+              </a:ext>
+            </a:extLst>
+          </p:cNvPr>
+          <p:cNvSpPr>
+            <a:spLocks noGrp="1"/>
+          </p:cNvSpPr>
+          <p:nvPr>
+            <p:ph type="title"/>
+          </p:nvPr>
+        </p:nvSpPr>
+        <p:spPr/>
+        <p:txBody>
+          <a:bodyPr/>
+          <a:lstStyle/>
+          <a:p>
+            <a:r>
+              <a:rPr kumimoji="1" lang="ko-KR" altLang="en-US" sz="2800" dirty="0"/>
+              <a:t>이산시간으로 표현된 </a:t>
+            </a:r>
+            <a:r>
+              <a:rPr kumimoji="1" lang="en-US" altLang="ko-KR" sz="2800" dirty="0"/>
+              <a:t>RNN </a:t>
+            </a:r>
+            <a:r>
+              <a:rPr kumimoji="1" lang="ko-KR" altLang="en-US" sz="2800" dirty="0"/>
+              <a:t>방정식 </a:t>
+            </a:r>
+            <a:r>
+              <a:rPr kumimoji="1" lang="en-US" altLang="ko-KR" sz="2800" dirty="0"/>
+              <a:t>-</a:t>
+            </a:r>
+            <a:r>
+              <a:rPr kumimoji="1" lang="ko-KR" altLang="en-US" sz="2800" dirty="0"/>
+              <a:t> </a:t>
+            </a:r>
+            <a:r>
+              <a:rPr kumimoji="1" lang="en-US" altLang="ko-KR" sz="2800" dirty="0"/>
+              <a:t>reset</a:t>
+            </a:r>
+            <a:endParaRPr lang="ko-KR" altLang="en-US" sz="2800" dirty="0"/>
+          </a:p>
+        </p:txBody>
+      </p:sp>
+      <mc:AlternateContent xmlns:mc="http://schemas.openxmlformats.org/markup-compatibility/2006">
+        <mc:Choice xmlns:a14="http://schemas.microsoft.com/office/drawing/2010/main" Requires="a14">
+          <p:sp>
+            <p:nvSpPr>
+              <p:cNvPr id="3" name="내용 개체 틀 2">
+                <a:extLst>
+                  <a:ext uri="{FF2B5EF4-FFF2-40B4-BE49-F238E27FC236}">
+                    <a16:creationId xmlns:a16="http://schemas.microsoft.com/office/drawing/2014/main" id="{1D743593-A5DF-9BB9-D0F2-4E8D21BD24E2}"/>
+                  </a:ext>
+                </a:extLst>
+              </p:cNvPr>
+              <p:cNvSpPr>
+                <a:spLocks noGrp="1"/>
+              </p:cNvSpPr>
+              <p:nvPr>
+                <p:ph idx="1"/>
+              </p:nvPr>
+            </p:nvSpPr>
+            <p:spPr>
+              <a:xfrm>
+                <a:off x="611560" y="2206836"/>
+                <a:ext cx="8064500" cy="2823592"/>
+              </a:xfrm>
+            </p:spPr>
+            <p:txBody>
+              <a:bodyPr>
+                <a:normAutofit/>
+              </a:bodyPr>
+              <a:lstStyle/>
+              <a:p>
+                <a:endParaRPr lang="en-US" altLang="ko-KR" i="1" dirty="0">
+                  <a:latin typeface="Cambria Math" panose="02040503050406030204" pitchFamily="18" charset="0"/>
+                  <a:ea typeface="Cambria Math" panose="02040503050406030204" pitchFamily="18" charset="0"/>
+                </a:endParaRPr>
+              </a:p>
+              <a:p>
+                <a14:m>
+                  <m:oMath xmlns:m="http://schemas.openxmlformats.org/officeDocument/2006/math">
+                    <m:r>
+                      <m:rPr>
+                        <m:sty m:val="p"/>
+                      </m:rPr>
+                      <a:rPr lang="el-GR" altLang="ko-KR" i="1" smtClean="0">
+                        <a:latin typeface="Cambria Math" panose="02040503050406030204" pitchFamily="18" charset="0"/>
+                        <a:ea typeface="Cambria Math" panose="02040503050406030204" pitchFamily="18" charset="0"/>
+                      </a:rPr>
+                      <m:t>Θ</m:t>
+                    </m:r>
+                  </m:oMath>
+                </a14:m>
+                <a:r>
+                  <a:rPr lang="ko-KR" altLang="en-US" dirty="0"/>
+                  <a:t> </a:t>
+                </a:r>
+                <a:r>
+                  <a:rPr lang="en-US" altLang="ko-KR" dirty="0"/>
+                  <a:t>: </a:t>
+                </a:r>
+                <a:r>
+                  <a:rPr lang="ko-KR" altLang="en-US" dirty="0" err="1"/>
+                  <a:t>헤비사이드</a:t>
+                </a:r>
+                <a:r>
+                  <a:rPr lang="ko-KR" altLang="en-US" dirty="0"/>
+                  <a:t> 계단 함수</a:t>
+                </a:r>
+                <a:br>
+                  <a:rPr lang="en-US" altLang="ko-KR" dirty="0"/>
+                </a:br>
+                <a:r>
+                  <a:rPr lang="en-US" altLang="ko-KR" dirty="0"/>
+                  <a:t>(Heaviside step function)</a:t>
+                </a:r>
+              </a:p>
+              <a:p>
+                <a:pPr lvl="1"/>
+                <a14:m>
+                  <m:oMath xmlns:m="http://schemas.openxmlformats.org/officeDocument/2006/math">
+                    <m:r>
+                      <m:rPr>
+                        <m:sty m:val="p"/>
+                      </m:rPr>
+                      <a:rPr lang="el-GR" altLang="ko-KR" i="1" smtClean="0">
+                        <a:latin typeface="Cambria Math" panose="02040503050406030204" pitchFamily="18" charset="0"/>
+                        <a:ea typeface="Cambria Math" panose="02040503050406030204" pitchFamily="18" charset="0"/>
+                      </a:rPr>
+                      <m:t>Θ</m:t>
+                    </m:r>
+                  </m:oMath>
+                </a14:m>
+                <a:r>
+                  <a:rPr lang="en-US" altLang="ko-KR" dirty="0"/>
+                  <a:t>, </a:t>
+                </a:r>
+                <a14:m>
+                  <m:oMath xmlns:m="http://schemas.openxmlformats.org/officeDocument/2006/math">
+                    <m:r>
+                      <a:rPr lang="en-US" altLang="ko-KR" i="1">
+                        <a:latin typeface="Cambria Math" panose="02040503050406030204" pitchFamily="18" charset="0"/>
+                      </a:rPr>
+                      <m:t>𝑢</m:t>
+                    </m:r>
+                  </m:oMath>
+                </a14:m>
+                <a:r>
+                  <a:rPr lang="en-US" altLang="ko-KR" dirty="0"/>
+                  <a:t> </a:t>
+                </a:r>
+                <a:r>
+                  <a:rPr lang="ko-KR" altLang="en-US" dirty="0"/>
+                  <a:t>모두</a:t>
+                </a:r>
+                <a:r>
+                  <a:rPr lang="en-US" altLang="ko-KR" dirty="0"/>
+                  <a:t> </a:t>
+                </a:r>
+                <a:r>
+                  <a:rPr lang="ko-KR" altLang="en-US" dirty="0"/>
+                  <a:t>같은 표현</a:t>
+                </a:r>
+                <a:endParaRPr lang="en-US" altLang="ko-KR" dirty="0"/>
+              </a:p>
+              <a:p>
+                <a:pPr lvl="1"/>
+                <a:r>
+                  <a:rPr lang="ko-KR" altLang="en-US" dirty="0"/>
+                  <a:t>스파이크 같은 갑작스런 변화의 표현에 유용한 함수</a:t>
+                </a:r>
+                <a:endParaRPr lang="en-US" altLang="ko-KR" dirty="0"/>
+              </a:p>
+            </p:txBody>
+          </p:sp>
+        </mc:Choice>
+        <mc:Fallback>
+          <p:sp>
+            <p:nvSpPr>
+              <p:cNvPr id="3" name="내용 개체 틀 2">
+                <a:extLst>
+                  <a:ext uri="{FF2B5EF4-FFF2-40B4-BE49-F238E27FC236}">
+                    <a16:creationId xmlns:a16="http://schemas.microsoft.com/office/drawing/2014/main" id="{1D743593-A5DF-9BB9-D0F2-4E8D21BD24E2}"/>
+                  </a:ext>
+                </a:extLst>
+              </p:cNvPr>
+              <p:cNvSpPr>
+                <a:spLocks noGrp="1" noRot="1" noChangeAspect="1" noMove="1" noResize="1" noEditPoints="1" noAdjustHandles="1" noChangeArrowheads="1" noChangeShapeType="1" noTextEdit="1"/>
+              </p:cNvSpPr>
+              <p:nvPr>
+                <p:ph idx="1"/>
+              </p:nvPr>
+            </p:nvSpPr>
+            <p:spPr>
+              <a:xfrm>
+                <a:off x="611560" y="2206836"/>
+                <a:ext cx="8064500" cy="2823592"/>
+              </a:xfrm>
+              <a:blipFill>
+                <a:blip r:embed="rId2"/>
+                <a:stretch>
+                  <a:fillRect/>
+                </a:stretch>
+              </a:blipFill>
+            </p:spPr>
+            <p:txBody>
+              <a:bodyPr/>
+              <a:lstStyle/>
+              <a:p>
+                <a:r>
+                  <a:rPr lang="ko-KR" altLang="en-US">
+                    <a:noFill/>
+                  </a:rPr>
+                  <a:t> </a:t>
+                </a:r>
+              </a:p>
+            </p:txBody>
+          </p:sp>
+        </mc:Fallback>
+      </mc:AlternateContent>
+      <p:pic>
+        <p:nvPicPr>
+          <p:cNvPr id="4" name="내용 개체 틀 4" descr="폰트, 친필, 텍스트, 그래픽이(가) 표시된 사진&#10;&#10;자동 생성된 설명">
+            <a:extLst>
+              <a:ext uri="{FF2B5EF4-FFF2-40B4-BE49-F238E27FC236}">
+                <a16:creationId xmlns:a16="http://schemas.microsoft.com/office/drawing/2014/main" id="{44073FA6-5F65-02DC-CE52-7AB189A64202}"/>
+              </a:ext>
+            </a:extLst>
+          </p:cNvPr>
+          <p:cNvPicPr>
+            <a:picLocks noChangeAspect="1"/>
+          </p:cNvPicPr>
+          <p:nvPr/>
+        </p:nvPicPr>
+        <p:blipFill>
+          <a:blip r:embed="rId3">
+            <a:extLst>
+              <a:ext uri="{28A0092B-C50C-407E-A947-70E740481C1C}">
+                <a14:useLocalDpi xmlns:a14="http://schemas.microsoft.com/office/drawing/2010/main" val="0"/>
+              </a:ext>
+            </a:extLst>
+          </a:blip>
+          <a:stretch>
+            <a:fillRect/>
+          </a:stretch>
+        </p:blipFill>
+        <p:spPr>
+          <a:xfrm>
+            <a:off x="755650" y="1124743"/>
+            <a:ext cx="3384302" cy="938691"/>
+          </a:xfrm>
+          <a:prstGeom prst="rect">
+            <a:avLst/>
+          </a:prstGeom>
+          <a:noFill/>
+          <a:ln w="9525">
+            <a:noFill/>
+            <a:miter/>
+          </a:ln>
+        </p:spPr>
+      </p:pic>
+      <p:pic>
+        <p:nvPicPr>
+          <p:cNvPr id="6" name="그림 5">
+            <a:extLst>
+              <a:ext uri="{FF2B5EF4-FFF2-40B4-BE49-F238E27FC236}">
+                <a16:creationId xmlns:a16="http://schemas.microsoft.com/office/drawing/2014/main" id="{5F88A92F-C5B0-087C-FE3C-FCECD72B0FB7}"/>
+              </a:ext>
+            </a:extLst>
+          </p:cNvPr>
+          <p:cNvPicPr>
+            <a:picLocks noChangeAspect="1"/>
+          </p:cNvPicPr>
+          <p:nvPr/>
+        </p:nvPicPr>
+        <p:blipFill>
+          <a:blip r:embed="rId4"/>
+          <a:stretch>
+            <a:fillRect/>
+          </a:stretch>
+        </p:blipFill>
+        <p:spPr>
+          <a:xfrm>
+            <a:off x="5402728" y="1124743"/>
+            <a:ext cx="3417423" cy="938691"/>
+          </a:xfrm>
+          <a:prstGeom prst="rect">
+            <a:avLst/>
+          </a:prstGeom>
+        </p:spPr>
+      </p:pic>
+      <p:sp>
+        <p:nvSpPr>
+          <p:cNvPr id="7" name="화살표: 오른쪽 6">
+            <a:extLst>
+              <a:ext uri="{FF2B5EF4-FFF2-40B4-BE49-F238E27FC236}">
+                <a16:creationId xmlns:a16="http://schemas.microsoft.com/office/drawing/2014/main" id="{DFF05ECA-D715-1315-A4D1-D2161236570A}"/>
+              </a:ext>
+            </a:extLst>
+          </p:cNvPr>
+          <p:cNvSpPr/>
+          <p:nvPr/>
+        </p:nvSpPr>
+        <p:spPr>
+          <a:xfrm>
+            <a:off x="4375296" y="1334553"/>
+            <a:ext cx="792088" cy="504056"/>
+          </a:xfrm>
+          <a:prstGeom prst="rightArrow">
+            <a:avLst/>
+          </a:prstGeom>
+          <a:solidFill>
+            <a:schemeClr val="tx1"/>
+          </a:solidFill>
+          <a:ln w="28575" cap="flat" cmpd="sng" algn="ctr">
+            <a:solidFill>
+              <a:schemeClr val="tx1"/>
+            </a:solidFill>
+            <a:prstDash val="solid"/>
+            <a:round/>
+          </a:ln>
+          <a:effectLst/>
+        </p:spPr>
+        <p:txBody>
+          <a:bodyPr vert="horz" wrap="none" lIns="91440" tIns="45720" rIns="91440" bIns="45720" numCol="1" rtlCol="0" anchor="ctr" anchorCtr="0" compatLnSpc="1">
+            <a:prstTxWarp prst="textNoShape">
+              <a:avLst/>
+            </a:prstTxWarp>
+            <a:spAutoFit/>
+          </a:bodyPr>
+          <a:lstStyle/>
+          <a:p>
+            <a:pPr marL="0" marR="0" indent="0" algn="ctr" defTabSz="914400" rtl="0" eaLnBrk="1" fontAlgn="base" latinLnBrk="1" hangingPunct="1">
+              <a:lnSpc>
+                <a:spcPct val="100000"/>
+              </a:lnSpc>
+              <a:spcBef>
+                <a:spcPct val="0"/>
+              </a:spcBef>
+              <a:spcAft>
+                <a:spcPct val="0"/>
+              </a:spcAft>
+              <a:buNone/>
+            </a:pPr>
+            <a:endParaRPr kumimoji="1" lang="ko-KR" altLang="en-US" sz="2400" i="0" u="none" strike="noStrike" normalizeH="0" baseline="0">
+              <a:latin typeface="Times New Roman"/>
+              <a:ea typeface="굴림"/>
+            </a:endParaRPr>
+          </a:p>
+        </p:txBody>
+      </p:sp>
+      <mc:AlternateContent xmlns:mc="http://schemas.openxmlformats.org/markup-compatibility/2006">
+        <mc:Choice xmlns:a14="http://schemas.microsoft.com/office/drawing/2010/main" Requires="a14">
+          <p:sp>
+            <p:nvSpPr>
+              <p:cNvPr id="9" name="TextBox 8">
+                <a:extLst>
+                  <a:ext uri="{FF2B5EF4-FFF2-40B4-BE49-F238E27FC236}">
+                    <a16:creationId xmlns:a16="http://schemas.microsoft.com/office/drawing/2014/main" id="{B8C23053-76AC-A38C-0A27-7AC3DF6B5538}"/>
+                  </a:ext>
+                </a:extLst>
+              </p:cNvPr>
+              <p:cNvSpPr txBox="1"/>
+              <p:nvPr/>
+            </p:nvSpPr>
+            <p:spPr>
+              <a:xfrm>
+                <a:off x="6012160" y="2307492"/>
+                <a:ext cx="2358937" cy="1757148"/>
+              </a:xfrm>
+              <a:prstGeom prst="rect">
+                <a:avLst/>
+              </a:prstGeom>
+              <a:noFill/>
+              <a:ln w="28575">
+                <a:solidFill>
+                  <a:schemeClr val="tx1"/>
+                </a:solidFill>
+              </a:ln>
+            </p:spPr>
+            <p:txBody>
+              <a:bodyPr wrap="square" rtlCol="0">
+                <a:spAutoFit/>
+              </a:bodyPr>
+              <a:lstStyle/>
+              <a:p>
+                <a14:m>
+                  <m:oMathPara xmlns:m="http://schemas.openxmlformats.org/officeDocument/2006/math">
+                    <m:oMathParaPr>
+                      <m:jc m:val="centerGroup"/>
+                    </m:oMathParaPr>
+                    <m:oMath xmlns:m="http://schemas.openxmlformats.org/officeDocument/2006/math">
+                      <m:r>
+                        <a:rPr lang="en-US" altLang="ko-KR" b="0" i="1" smtClean="0">
+                          <a:latin typeface="Cambria Math" panose="02040503050406030204" pitchFamily="18" charset="0"/>
+                        </a:rPr>
+                        <m:t>𝑢</m:t>
+                      </m:r>
+                      <m:r>
+                        <a:rPr lang="en-US" altLang="ko-KR" b="0" i="1" smtClean="0">
+                          <a:latin typeface="Cambria Math" panose="02040503050406030204" pitchFamily="18" charset="0"/>
+                        </a:rPr>
+                        <m:t>(</m:t>
+                      </m:r>
+                      <m:r>
+                        <a:rPr lang="en-US" altLang="ko-KR" b="0" i="1" smtClean="0">
+                          <a:latin typeface="Cambria Math" panose="02040503050406030204" pitchFamily="18" charset="0"/>
+                        </a:rPr>
+                        <m:t>𝑥</m:t>
+                      </m:r>
+                      <m:r>
+                        <a:rPr lang="en-US" altLang="ko-KR" b="0" i="1" smtClean="0">
+                          <a:latin typeface="Cambria Math" panose="02040503050406030204" pitchFamily="18" charset="0"/>
+                        </a:rPr>
+                        <m:t>)</m:t>
+                      </m:r>
+                      <m:d>
+                        <m:dPr>
+                          <m:begChr m:val="{"/>
+                          <m:endChr m:val=""/>
+                          <m:ctrlPr>
+                            <a:rPr lang="en-US" altLang="ko-KR" i="1" smtClean="0">
+                              <a:latin typeface="Cambria Math" panose="02040503050406030204" pitchFamily="18" charset="0"/>
+                            </a:rPr>
+                          </m:ctrlPr>
+                        </m:dPr>
+                        <m:e>
+                          <m:eqArr>
+                            <m:eqArrPr>
+                              <m:ctrlPr>
+                                <a:rPr lang="en-US" altLang="ko-KR" i="1" smtClean="0">
+                                  <a:latin typeface="Cambria Math" panose="02040503050406030204" pitchFamily="18" charset="0"/>
+                                </a:rPr>
+                              </m:ctrlPr>
+                            </m:eqArrPr>
+                            <m:e>
+                              <m:r>
+                                <a:rPr lang="en-US" altLang="ko-KR" b="0" i="1" smtClean="0">
+                                  <a:latin typeface="Cambria Math" panose="02040503050406030204" pitchFamily="18" charset="0"/>
+                                </a:rPr>
+                                <m:t>1 (</m:t>
+                              </m:r>
+                              <m:r>
+                                <a:rPr lang="en-US" altLang="ko-KR" b="0" i="1" smtClean="0">
+                                  <a:latin typeface="Cambria Math" panose="02040503050406030204" pitchFamily="18" charset="0"/>
+                                </a:rPr>
+                                <m:t>𝑥</m:t>
+                              </m:r>
+                              <m:r>
+                                <a:rPr lang="en-US" altLang="ko-KR" b="0" i="1" smtClean="0">
+                                  <a:latin typeface="Cambria Math" panose="02040503050406030204" pitchFamily="18" charset="0"/>
+                                </a:rPr>
+                                <m:t>&gt;0)</m:t>
+                              </m:r>
+                            </m:e>
+                            <m:e>
+                              <m:f>
+                                <m:fPr>
+                                  <m:ctrlPr>
+                                    <a:rPr lang="en-US" altLang="ko-KR" i="1" smtClean="0">
+                                      <a:latin typeface="Cambria Math" panose="02040503050406030204" pitchFamily="18" charset="0"/>
+                                    </a:rPr>
+                                  </m:ctrlPr>
+                                </m:fPr>
+                                <m:num>
+                                  <m:r>
+                                    <a:rPr lang="en-US" altLang="ko-KR" b="0" i="1" smtClean="0">
+                                      <a:latin typeface="Cambria Math" panose="02040503050406030204" pitchFamily="18" charset="0"/>
+                                    </a:rPr>
+                                    <m:t>1</m:t>
+                                  </m:r>
+                                </m:num>
+                                <m:den>
+                                  <m:r>
+                                    <a:rPr lang="en-US" altLang="ko-KR" b="0" i="1" smtClean="0">
+                                      <a:latin typeface="Cambria Math" panose="02040503050406030204" pitchFamily="18" charset="0"/>
+                                    </a:rPr>
+                                    <m:t>2</m:t>
+                                  </m:r>
+                                </m:den>
+                              </m:f>
+                              <m:r>
+                                <a:rPr lang="en-US" altLang="ko-KR" b="0" i="1" smtClean="0">
+                                  <a:latin typeface="Cambria Math" panose="02040503050406030204" pitchFamily="18" charset="0"/>
+                                </a:rPr>
+                                <m:t> (</m:t>
+                              </m:r>
+                              <m:r>
+                                <a:rPr lang="en-US" altLang="ko-KR" b="0" i="1" smtClean="0">
+                                  <a:latin typeface="Cambria Math" panose="02040503050406030204" pitchFamily="18" charset="0"/>
+                                </a:rPr>
+                                <m:t>𝑥</m:t>
+                              </m:r>
+                              <m:r>
+                                <a:rPr lang="en-US" altLang="ko-KR" b="0" i="1" smtClean="0">
+                                  <a:latin typeface="Cambria Math" panose="02040503050406030204" pitchFamily="18" charset="0"/>
+                                </a:rPr>
+                                <m:t>=0)</m:t>
+                              </m:r>
+                            </m:e>
+                            <m:e>
+                              <m:r>
+                                <a:rPr lang="en-US" altLang="ko-KR" b="0" i="1" smtClean="0">
+                                  <a:latin typeface="Cambria Math" panose="02040503050406030204" pitchFamily="18" charset="0"/>
+                                </a:rPr>
+                                <m:t>0 (</m:t>
+                              </m:r>
+                              <m:r>
+                                <a:rPr lang="en-US" altLang="ko-KR" b="0" i="1" smtClean="0">
+                                  <a:latin typeface="Cambria Math" panose="02040503050406030204" pitchFamily="18" charset="0"/>
+                                </a:rPr>
+                                <m:t>𝑥</m:t>
+                              </m:r>
+                              <m:r>
+                                <a:rPr lang="en-US" altLang="ko-KR" b="0" i="1" smtClean="0">
+                                  <a:latin typeface="Cambria Math" panose="02040503050406030204" pitchFamily="18" charset="0"/>
+                                </a:rPr>
+                                <m:t>&lt;0)</m:t>
+                              </m:r>
+                            </m:e>
+                          </m:eqArr>
+                        </m:e>
+                      </m:d>
+                    </m:oMath>
+                  </m:oMathPara>
+                </a14:m>
+                <a:endParaRPr lang="ko-KR" altLang="en-US" dirty="0"/>
+              </a:p>
+            </p:txBody>
+          </p:sp>
+        </mc:Choice>
+        <mc:Fallback>
+          <p:sp>
+            <p:nvSpPr>
+              <p:cNvPr id="9" name="TextBox 8">
+                <a:extLst>
+                  <a:ext uri="{FF2B5EF4-FFF2-40B4-BE49-F238E27FC236}">
+                    <a16:creationId xmlns:a16="http://schemas.microsoft.com/office/drawing/2014/main" id="{B8C23053-76AC-A38C-0A27-7AC3DF6B5538}"/>
+                  </a:ext>
+                </a:extLst>
+              </p:cNvPr>
+              <p:cNvSpPr txBox="1">
+                <a:spLocks noRot="1" noChangeAspect="1" noMove="1" noResize="1" noEditPoints="1" noAdjustHandles="1" noChangeArrowheads="1" noChangeShapeType="1" noTextEdit="1"/>
+              </p:cNvSpPr>
+              <p:nvPr/>
+            </p:nvSpPr>
+            <p:spPr>
+              <a:xfrm>
+                <a:off x="6012160" y="2307492"/>
+                <a:ext cx="2358937" cy="1757148"/>
+              </a:xfrm>
+              <a:prstGeom prst="rect">
+                <a:avLst/>
+              </a:prstGeom>
+              <a:blipFill>
+                <a:blip r:embed="rId5"/>
+                <a:stretch>
+                  <a:fillRect/>
+                </a:stretch>
+              </a:blipFill>
+              <a:ln w="28575">
+                <a:solidFill>
+                  <a:schemeClr val="tx1"/>
+                </a:solidFill>
+              </a:ln>
+            </p:spPr>
+            <p:txBody>
+              <a:bodyPr/>
+              <a:lstStyle/>
+              <a:p>
+                <a:r>
+                  <a:rPr lang="ko-KR" altLang="en-US">
+                    <a:noFill/>
+                  </a:rPr>
+                  <a:t> </a:t>
+                </a:r>
+              </a:p>
+            </p:txBody>
+          </p:sp>
+        </mc:Fallback>
+      </mc:AlternateContent>
+    </p:spTree>
+    <p:extLst>
+      <p:ext uri="{BB962C8B-B14F-4D97-AF65-F5344CB8AC3E}">
+        <p14:creationId xmlns:p14="http://schemas.microsoft.com/office/powerpoint/2010/main" val="2779994497"/>
+      </p:ext>
+    </p:extLst>
+  </p:cSld>
+  <p:clrMapOvr>
+    <a:masterClrMapping/>
+  </p:clrMapOvr>
+</p:sld>
+</file>
+
+<file path=ppt/slides/slide15.xml><?xml version="1.0" encoding="utf-8"?>
+<p:sld xmlns:a="http://schemas.openxmlformats.org/drawingml/2006/main" xmlns:r="http://schemas.openxmlformats.org/officeDocument/2006/relationships" xmlns:p="http://schemas.openxmlformats.org/presentationml/2006/main">
+  <p:cSld>
+    <p:spTree>
+      <p:nvGrpSpPr>
+        <p:cNvPr id="1" name=""/>
+        <p:cNvGrpSpPr/>
+        <p:nvPr/>
+      </p:nvGrpSpPr>
+      <p:grpSpPr>
+        <a:xfrm>
+          <a:off x="0" y="0"/>
+          <a:ext cx="0" cy="0"/>
+          <a:chOff x="0" y="0"/>
+          <a:chExt cx="0" cy="0"/>
+        </a:xfrm>
+      </p:grpSpPr>
+      <p:sp>
+        <p:nvSpPr>
+          <p:cNvPr id="2" name="제목 1">
+            <a:extLst>
+              <a:ext uri="{FF2B5EF4-FFF2-40B4-BE49-F238E27FC236}">
+                <a16:creationId xmlns:a16="http://schemas.microsoft.com/office/drawing/2014/main" id="{F47BB97A-18FB-650C-7997-126D2ACA4C8B}"/>
+              </a:ext>
+            </a:extLst>
+          </p:cNvPr>
+          <p:cNvSpPr>
+            <a:spLocks noGrp="1"/>
+          </p:cNvSpPr>
+          <p:nvPr>
+            <p:ph type="title"/>
+          </p:nvPr>
+        </p:nvSpPr>
+        <p:spPr/>
+        <p:txBody>
+          <a:bodyPr/>
+          <a:lstStyle/>
+          <a:p>
+            <a:r>
+              <a:rPr lang="ko-KR" altLang="en-US" dirty="0"/>
+              <a:t>시냅스 역할 근사화 </a:t>
+            </a:r>
+            <a:r>
+              <a:rPr lang="en-US" altLang="ko-KR" dirty="0"/>
+              <a:t>-</a:t>
+            </a:r>
+            <a:r>
+              <a:rPr lang="ko-KR" altLang="en-US" dirty="0"/>
+              <a:t> </a:t>
+            </a:r>
+            <a:r>
+              <a:rPr lang="en-US" altLang="ko-KR" dirty="0"/>
+              <a:t>input</a:t>
+            </a:r>
+            <a:endParaRPr lang="ko-KR" altLang="en-US" dirty="0"/>
+          </a:p>
+        </p:txBody>
+      </p:sp>
+      <mc:AlternateContent xmlns:mc="http://schemas.openxmlformats.org/markup-compatibility/2006">
+        <mc:Choice xmlns:a14="http://schemas.microsoft.com/office/drawing/2010/main" Requires="a14">
+          <p:sp>
+            <p:nvSpPr>
+              <p:cNvPr id="3" name="내용 개체 틀 2">
+                <a:extLst>
+                  <a:ext uri="{FF2B5EF4-FFF2-40B4-BE49-F238E27FC236}">
+                    <a16:creationId xmlns:a16="http://schemas.microsoft.com/office/drawing/2014/main" id="{5968E877-6052-9C2A-317D-6A461E8EFCC8}"/>
+                  </a:ext>
+                </a:extLst>
+              </p:cNvPr>
+              <p:cNvSpPr>
+                <a:spLocks noGrp="1"/>
+              </p:cNvSpPr>
+              <p:nvPr>
+                <p:ph idx="1"/>
+              </p:nvPr>
+            </p:nvSpPr>
+            <p:spPr>
+              <a:xfrm>
+                <a:off x="755649" y="2174870"/>
+                <a:ext cx="8064501" cy="4149730"/>
+              </a:xfrm>
+            </p:spPr>
+            <p:txBody>
+              <a:bodyPr/>
+              <a:lstStyle/>
+              <a:p>
+                <a:r>
+                  <a:rPr lang="ko-KR" altLang="en-US" dirty="0"/>
+                  <a:t>입력 전류 시뮬레이션에서 사용할 수 있게</a:t>
+                </a:r>
+                <a:r>
+                  <a:rPr lang="en-US" altLang="ko-KR" dirty="0"/>
+                  <a:t> </a:t>
+                </a:r>
+                <a:br>
+                  <a:rPr lang="en-US" altLang="ko-KR" dirty="0"/>
+                </a:br>
+                <a:r>
+                  <a:rPr lang="ko-KR" altLang="en-US" dirty="0" err="1"/>
+                  <a:t>근사화한</a:t>
+                </a:r>
+                <a:r>
+                  <a:rPr lang="ko-KR" altLang="en-US" dirty="0"/>
+                  <a:t> 수식</a:t>
+                </a:r>
+                <a:endParaRPr lang="en-US" altLang="ko-KR" dirty="0"/>
+              </a:p>
+              <a:p>
+                <a:r>
+                  <a:rPr lang="en-US" altLang="ko-KR" dirty="0"/>
+                  <a:t>*</a:t>
+                </a:r>
+                <a:r>
+                  <a:rPr lang="ko-KR" altLang="en-US" dirty="0"/>
+                  <a:t>다음 전류 값을 예측</a:t>
+                </a:r>
+                <a:endParaRPr lang="en-US" altLang="ko-KR" dirty="0"/>
+              </a:p>
+              <a:p>
+                <a:endParaRPr lang="en-US" altLang="ko-KR" dirty="0"/>
+              </a:p>
+              <a:p>
+                <a14:m>
+                  <m:oMath xmlns:m="http://schemas.openxmlformats.org/officeDocument/2006/math">
+                    <m:r>
+                      <m:rPr>
+                        <m:sty m:val="p"/>
+                      </m:rPr>
+                      <a:rPr lang="el-GR" altLang="ko-KR" i="1" smtClean="0">
+                        <a:latin typeface="Cambria Math" panose="02040503050406030204" pitchFamily="18" charset="0"/>
+                        <a:ea typeface="Cambria Math" panose="02040503050406030204" pitchFamily="18" charset="0"/>
+                      </a:rPr>
+                      <m:t>Δ</m:t>
+                    </m:r>
+                  </m:oMath>
+                </a14:m>
+                <a:r>
+                  <a:rPr lang="en-US" altLang="ko-KR" dirty="0"/>
+                  <a:t>t : </a:t>
+                </a:r>
+                <a:r>
+                  <a:rPr lang="ko-KR" altLang="en-US" dirty="0"/>
+                  <a:t>시뮬레이션 시간 간격</a:t>
+                </a:r>
+                <a:endParaRPr lang="en-US" altLang="ko-KR" dirty="0"/>
+              </a:p>
+              <a:p>
+                <a14:m>
+                  <m:oMath xmlns:m="http://schemas.openxmlformats.org/officeDocument/2006/math">
+                    <m:r>
+                      <a:rPr lang="ko-KR" altLang="en-US" b="0" i="1" smtClean="0">
+                        <a:latin typeface="Cambria Math" panose="02040503050406030204" pitchFamily="18" charset="0"/>
+                      </a:rPr>
+                      <m:t>𝛼</m:t>
+                    </m:r>
+                    <m:r>
+                      <a:rPr lang="en-US" altLang="ko-KR" b="0" i="1" smtClean="0">
+                        <a:latin typeface="Cambria Math" panose="02040503050406030204" pitchFamily="18" charset="0"/>
+                      </a:rPr>
+                      <m:t>=</m:t>
+                    </m:r>
+                    <m:func>
+                      <m:funcPr>
+                        <m:ctrlPr>
+                          <a:rPr lang="en-US" altLang="ko-KR" b="0" i="1" smtClean="0">
+                            <a:latin typeface="Cambria Math" panose="02040503050406030204" pitchFamily="18" charset="0"/>
+                          </a:rPr>
+                        </m:ctrlPr>
+                      </m:funcPr>
+                      <m:fName>
+                        <m:r>
+                          <m:rPr>
+                            <m:sty m:val="p"/>
+                          </m:rPr>
+                          <a:rPr lang="en-US" altLang="ko-KR" b="0" i="0" smtClean="0">
+                            <a:latin typeface="Cambria Math" panose="02040503050406030204" pitchFamily="18" charset="0"/>
+                          </a:rPr>
+                          <m:t>exp</m:t>
+                        </m:r>
+                      </m:fName>
+                      <m:e>
+                        <m:d>
+                          <m:dPr>
+                            <m:ctrlPr>
+                              <a:rPr lang="en-US" altLang="ko-KR" b="0" i="1" smtClean="0">
+                                <a:latin typeface="Cambria Math" panose="02040503050406030204" pitchFamily="18" charset="0"/>
+                              </a:rPr>
+                            </m:ctrlPr>
+                          </m:dPr>
+                          <m:e>
+                            <m:r>
+                              <a:rPr lang="en-US" altLang="ko-KR" b="0" i="1" smtClean="0">
+                                <a:latin typeface="Cambria Math" panose="02040503050406030204" pitchFamily="18" charset="0"/>
+                              </a:rPr>
+                              <m:t>−</m:t>
+                            </m:r>
+                            <m:f>
+                              <m:fPr>
+                                <m:ctrlPr>
+                                  <a:rPr lang="en-US" altLang="ko-KR" b="0" i="1" smtClean="0">
+                                    <a:latin typeface="Cambria Math" panose="02040503050406030204" pitchFamily="18" charset="0"/>
+                                  </a:rPr>
+                                </m:ctrlPr>
+                              </m:fPr>
+                              <m:num>
+                                <m:r>
+                                  <m:rPr>
+                                    <m:sty m:val="p"/>
+                                  </m:rPr>
+                                  <a:rPr lang="el-GR" altLang="ko-KR" i="1">
+                                    <a:latin typeface="Cambria Math" panose="02040503050406030204" pitchFamily="18" charset="0"/>
+                                    <a:ea typeface="Cambria Math" panose="02040503050406030204" pitchFamily="18" charset="0"/>
+                                  </a:rPr>
+                                  <m:t>Δ</m:t>
+                                </m:r>
+                                <m:r>
+                                  <m:rPr>
+                                    <m:nor/>
+                                  </m:rPr>
+                                  <a:rPr lang="en-US" altLang="ko-KR" dirty="0"/>
+                                  <m:t>t</m:t>
+                                </m:r>
+                              </m:num>
+                              <m:den>
+                                <m:sSub>
+                                  <m:sSubPr>
+                                    <m:ctrlPr>
+                                      <a:rPr lang="en-US" altLang="ko-KR" b="0" i="1" smtClean="0">
+                                        <a:latin typeface="Cambria Math" panose="02040503050406030204" pitchFamily="18" charset="0"/>
+                                      </a:rPr>
+                                    </m:ctrlPr>
+                                  </m:sSubPr>
+                                  <m:e>
+                                    <m:r>
+                                      <a:rPr lang="en-US" altLang="ko-KR" b="0" i="1" smtClean="0">
+                                        <a:latin typeface="Cambria Math" panose="02040503050406030204" pitchFamily="18" charset="0"/>
+                                      </a:rPr>
+                                      <m:t>𝑇</m:t>
+                                    </m:r>
+                                  </m:e>
+                                  <m:sub>
+                                    <m:r>
+                                      <a:rPr lang="en-US" altLang="ko-KR" b="0" i="1" smtClean="0">
+                                        <a:latin typeface="Cambria Math" panose="02040503050406030204" pitchFamily="18" charset="0"/>
+                                      </a:rPr>
+                                      <m:t>𝑠𝑦𝑛</m:t>
+                                    </m:r>
+                                  </m:sub>
+                                </m:sSub>
+                              </m:den>
+                            </m:f>
+                          </m:e>
+                        </m:d>
+                      </m:e>
+                    </m:func>
+                  </m:oMath>
+                </a14:m>
+                <a:r>
+                  <a:rPr lang="ko-KR" altLang="en-US" dirty="0"/>
+                  <a:t>상수로 지정</a:t>
+                </a:r>
+              </a:p>
+            </p:txBody>
+          </p:sp>
+        </mc:Choice>
+        <mc:Fallback>
+          <p:sp>
+            <p:nvSpPr>
+              <p:cNvPr id="3" name="내용 개체 틀 2">
+                <a:extLst>
+                  <a:ext uri="{FF2B5EF4-FFF2-40B4-BE49-F238E27FC236}">
+                    <a16:creationId xmlns:a16="http://schemas.microsoft.com/office/drawing/2014/main" id="{5968E877-6052-9C2A-317D-6A461E8EFCC8}"/>
+                  </a:ext>
+                </a:extLst>
+              </p:cNvPr>
+              <p:cNvSpPr>
+                <a:spLocks noGrp="1" noRot="1" noChangeAspect="1" noMove="1" noResize="1" noEditPoints="1" noAdjustHandles="1" noChangeArrowheads="1" noChangeShapeType="1" noTextEdit="1"/>
+              </p:cNvSpPr>
+              <p:nvPr>
+                <p:ph idx="1"/>
+              </p:nvPr>
+            </p:nvSpPr>
+            <p:spPr>
+              <a:xfrm>
+                <a:off x="755649" y="2174870"/>
+                <a:ext cx="8064501" cy="4149730"/>
+              </a:xfrm>
+              <a:blipFill>
+                <a:blip r:embed="rId2"/>
+                <a:stretch>
+                  <a:fillRect l="-907" t="-1615"/>
+                </a:stretch>
+              </a:blipFill>
+            </p:spPr>
+            <p:txBody>
+              <a:bodyPr/>
+              <a:lstStyle/>
+              <a:p>
+                <a:r>
+                  <a:rPr lang="ko-KR" altLang="en-US">
+                    <a:noFill/>
+                  </a:rPr>
+                  <a:t> </a:t>
+                </a:r>
+              </a:p>
+            </p:txBody>
+          </p:sp>
+        </mc:Fallback>
+      </mc:AlternateContent>
+      <p:pic>
+        <p:nvPicPr>
+          <p:cNvPr id="5" name="그림 4">
+            <a:extLst>
+              <a:ext uri="{FF2B5EF4-FFF2-40B4-BE49-F238E27FC236}">
+                <a16:creationId xmlns:a16="http://schemas.microsoft.com/office/drawing/2014/main" id="{CF60A634-7473-2412-5D08-C385BDD8E44C}"/>
+              </a:ext>
+            </a:extLst>
+          </p:cNvPr>
+          <p:cNvPicPr>
+            <a:picLocks noChangeAspect="1"/>
+          </p:cNvPicPr>
+          <p:nvPr/>
+        </p:nvPicPr>
+        <p:blipFill>
+          <a:blip r:embed="rId3"/>
+          <a:stretch>
+            <a:fillRect/>
+          </a:stretch>
+        </p:blipFill>
+        <p:spPr>
+          <a:xfrm>
+            <a:off x="755649" y="1052736"/>
+            <a:ext cx="7059147" cy="936104"/>
+          </a:xfrm>
+          <a:prstGeom prst="rect">
+            <a:avLst/>
+          </a:prstGeom>
+        </p:spPr>
+      </p:pic>
+      <p:pic>
+        <p:nvPicPr>
+          <p:cNvPr id="7" name="그림 6">
+            <a:extLst>
+              <a:ext uri="{FF2B5EF4-FFF2-40B4-BE49-F238E27FC236}">
+                <a16:creationId xmlns:a16="http://schemas.microsoft.com/office/drawing/2014/main" id="{C1786FBE-CC11-AC35-72A2-FB96AEE7B192}"/>
+              </a:ext>
+            </a:extLst>
+          </p:cNvPr>
+          <p:cNvPicPr>
+            <a:picLocks noChangeAspect="1"/>
+          </p:cNvPicPr>
+          <p:nvPr/>
+        </p:nvPicPr>
+        <p:blipFill rotWithShape="1">
+          <a:blip r:embed="rId4"/>
+          <a:srcRect/>
+          <a:stretch/>
+        </p:blipFill>
+        <p:spPr>
+          <a:xfrm>
+            <a:off x="7848183" y="1055535"/>
+            <a:ext cx="971967" cy="514571"/>
+          </a:xfrm>
+          <a:prstGeom prst="rect">
+            <a:avLst/>
+          </a:prstGeom>
+        </p:spPr>
+      </p:pic>
+    </p:spTree>
+    <p:extLst>
+      <p:ext uri="{BB962C8B-B14F-4D97-AF65-F5344CB8AC3E}">
+        <p14:creationId xmlns:p14="http://schemas.microsoft.com/office/powerpoint/2010/main" val="356014148"/>
+      </p:ext>
+    </p:extLst>
+  </p:cSld>
+  <p:clrMapOvr>
+    <a:masterClrMapping/>
+  </p:clrMapOvr>
+</p:sld>
+</file>
+
+<file path=ppt/slides/slide16.xml><?xml version="1.0" encoding="utf-8"?>
+<p:sld xmlns:a="http://schemas.openxmlformats.org/drawingml/2006/main" xmlns:r="http://schemas.openxmlformats.org/officeDocument/2006/relationships" xmlns:p="http://schemas.openxmlformats.org/presentationml/2006/main">
+  <p:cSld>
+    <p:spTree>
+      <p:nvGrpSpPr>
+        <p:cNvPr id="1" name=""/>
+        <p:cNvGrpSpPr/>
+        <p:nvPr/>
+      </p:nvGrpSpPr>
+      <p:grpSpPr>
+        <a:xfrm>
+          <a:off x="0" y="0"/>
+          <a:ext cx="0" cy="0"/>
+          <a:chOff x="0" y="0"/>
+          <a:chExt cx="0" cy="0"/>
+        </a:xfrm>
+      </p:grpSpPr>
+      <p:sp>
+        <p:nvSpPr>
+          <p:cNvPr id="2" name="제목 1">
+            <a:extLst>
+              <a:ext uri="{FF2B5EF4-FFF2-40B4-BE49-F238E27FC236}">
+                <a16:creationId xmlns:a16="http://schemas.microsoft.com/office/drawing/2014/main" id="{E9CE21FD-85B2-20E1-D750-8D2320E16AA3}"/>
+              </a:ext>
+            </a:extLst>
+          </p:cNvPr>
+          <p:cNvSpPr>
+            <a:spLocks noGrp="1"/>
+          </p:cNvSpPr>
+          <p:nvPr>
+            <p:ph type="title"/>
+          </p:nvPr>
+        </p:nvSpPr>
+        <p:spPr/>
+        <p:txBody>
+          <a:bodyPr/>
+          <a:lstStyle/>
+          <a:p>
+            <a:r>
+              <a:rPr lang="en-US" altLang="ko-KR" dirty="0"/>
+              <a:t>LIF</a:t>
+            </a:r>
+            <a:r>
+              <a:rPr lang="ko-KR" altLang="en-US" dirty="0"/>
+              <a:t> 시뮬레이션 모델</a:t>
+            </a:r>
+          </a:p>
+        </p:txBody>
+      </p:sp>
+      <mc:AlternateContent xmlns:mc="http://schemas.openxmlformats.org/markup-compatibility/2006">
+        <mc:Choice xmlns:a14="http://schemas.microsoft.com/office/drawing/2010/main" Requires="a14">
+          <p:sp>
+            <p:nvSpPr>
+              <p:cNvPr id="3" name="내용 개체 틀 2">
+                <a:extLst>
+                  <a:ext uri="{FF2B5EF4-FFF2-40B4-BE49-F238E27FC236}">
+                    <a16:creationId xmlns:a16="http://schemas.microsoft.com/office/drawing/2014/main" id="{F06A6085-F993-7E79-20E4-92FB6F0F2F6A}"/>
+                  </a:ext>
+                </a:extLst>
+              </p:cNvPr>
+              <p:cNvSpPr>
+                <a:spLocks noGrp="1"/>
+              </p:cNvSpPr>
+              <p:nvPr>
+                <p:ph idx="1"/>
+              </p:nvPr>
+            </p:nvSpPr>
+            <p:spPr>
+              <a:xfrm>
+                <a:off x="828675" y="4153916"/>
+                <a:ext cx="7991475" cy="2170684"/>
+              </a:xfrm>
+            </p:spPr>
+            <p:txBody>
+              <a:bodyPr/>
+              <a:lstStyle/>
+              <a:p>
+                <a:r>
+                  <a:rPr lang="ko-KR" altLang="en-US" dirty="0" err="1"/>
+                  <a:t>막전위</a:t>
+                </a:r>
+                <a:r>
+                  <a:rPr lang="ko-KR" altLang="en-US" dirty="0"/>
+                  <a:t> 예측</a:t>
+                </a:r>
+                <a:endParaRPr lang="en-US" altLang="ko-KR" dirty="0"/>
+              </a:p>
+              <a:p>
+                <a:r>
+                  <a:rPr lang="en-US" altLang="ko-KR" dirty="0"/>
+                  <a:t>LIF </a:t>
+                </a:r>
+                <a:r>
+                  <a:rPr lang="ko-KR" altLang="en-US" dirty="0"/>
+                  <a:t>시뮬레이션 수식 구현</a:t>
+                </a:r>
+                <a:endParaRPr lang="en-US" altLang="ko-KR" dirty="0"/>
+              </a:p>
+              <a:p>
+                <a14:m>
+                  <m:oMath xmlns:m="http://schemas.openxmlformats.org/officeDocument/2006/math">
+                    <m:r>
+                      <a:rPr lang="ko-KR" altLang="en-US" b="0" i="1" smtClean="0">
+                        <a:latin typeface="Cambria Math" panose="02040503050406030204" pitchFamily="18" charset="0"/>
+                      </a:rPr>
+                      <m:t>𝛽</m:t>
+                    </m:r>
+                    <m:r>
+                      <a:rPr lang="en-US" altLang="ko-KR" b="0" i="1" smtClean="0">
+                        <a:latin typeface="Cambria Math" panose="02040503050406030204" pitchFamily="18" charset="0"/>
+                      </a:rPr>
+                      <m:t>=</m:t>
+                    </m:r>
+                    <m:func>
+                      <m:funcPr>
+                        <m:ctrlPr>
+                          <a:rPr lang="en-US" altLang="ko-KR" b="0" i="1" smtClean="0">
+                            <a:latin typeface="Cambria Math" panose="02040503050406030204" pitchFamily="18" charset="0"/>
+                          </a:rPr>
+                        </m:ctrlPr>
+                      </m:funcPr>
+                      <m:fName>
+                        <m:r>
+                          <m:rPr>
+                            <m:sty m:val="p"/>
+                          </m:rPr>
+                          <a:rPr lang="en-US" altLang="ko-KR" b="0" i="0" smtClean="0">
+                            <a:latin typeface="Cambria Math" panose="02040503050406030204" pitchFamily="18" charset="0"/>
+                          </a:rPr>
+                          <m:t>exp</m:t>
+                        </m:r>
+                      </m:fName>
+                      <m:e>
+                        <m:d>
+                          <m:dPr>
+                            <m:ctrlPr>
+                              <a:rPr lang="en-US" altLang="ko-KR" b="0" i="1" smtClean="0">
+                                <a:latin typeface="Cambria Math" panose="02040503050406030204" pitchFamily="18" charset="0"/>
+                              </a:rPr>
+                            </m:ctrlPr>
+                          </m:dPr>
+                          <m:e>
+                            <m:r>
+                              <a:rPr lang="en-US" altLang="ko-KR" b="0" i="1" smtClean="0">
+                                <a:latin typeface="Cambria Math" panose="02040503050406030204" pitchFamily="18" charset="0"/>
+                              </a:rPr>
+                              <m:t>−</m:t>
+                            </m:r>
+                            <m:f>
+                              <m:fPr>
+                                <m:ctrlPr>
+                                  <a:rPr lang="en-US" altLang="ko-KR" b="0" i="1" smtClean="0">
+                                    <a:latin typeface="Cambria Math" panose="02040503050406030204" pitchFamily="18" charset="0"/>
+                                  </a:rPr>
+                                </m:ctrlPr>
+                              </m:fPr>
+                              <m:num>
+                                <m:r>
+                                  <m:rPr>
+                                    <m:sty m:val="p"/>
+                                  </m:rPr>
+                                  <a:rPr lang="el-GR" altLang="ko-KR" i="1">
+                                    <a:latin typeface="Cambria Math" panose="02040503050406030204" pitchFamily="18" charset="0"/>
+                                    <a:ea typeface="Cambria Math" panose="02040503050406030204" pitchFamily="18" charset="0"/>
+                                  </a:rPr>
+                                  <m:t>Δ</m:t>
+                                </m:r>
+                                <m:r>
+                                  <m:rPr>
+                                    <m:nor/>
+                                  </m:rPr>
+                                  <a:rPr lang="en-US" altLang="ko-KR" dirty="0"/>
+                                  <m:t>t</m:t>
+                                </m:r>
+                              </m:num>
+                              <m:den>
+                                <m:sSub>
+                                  <m:sSubPr>
+                                    <m:ctrlPr>
+                                      <a:rPr lang="en-US" altLang="ko-KR" b="0" i="1" smtClean="0">
+                                        <a:latin typeface="Cambria Math" panose="02040503050406030204" pitchFamily="18" charset="0"/>
+                                      </a:rPr>
+                                    </m:ctrlPr>
+                                  </m:sSubPr>
+                                  <m:e>
+                                    <m:r>
+                                      <a:rPr lang="en-US" altLang="ko-KR" b="0" i="1" smtClean="0">
+                                        <a:latin typeface="Cambria Math" panose="02040503050406030204" pitchFamily="18" charset="0"/>
+                                      </a:rPr>
+                                      <m:t>𝑇</m:t>
+                                    </m:r>
+                                  </m:e>
+                                  <m:sub>
+                                    <m:r>
+                                      <a:rPr lang="en-US" altLang="ko-KR" b="0" i="1" smtClean="0">
+                                        <a:latin typeface="Cambria Math" panose="02040503050406030204" pitchFamily="18" charset="0"/>
+                                      </a:rPr>
+                                      <m:t>𝑚𝑒𝑚</m:t>
+                                    </m:r>
+                                  </m:sub>
+                                </m:sSub>
+                              </m:den>
+                            </m:f>
+                          </m:e>
+                        </m:d>
+                      </m:e>
+                    </m:func>
+                  </m:oMath>
+                </a14:m>
+                <a:r>
+                  <a:rPr lang="ko-KR" altLang="en-US" dirty="0"/>
+                  <a:t>상수로 지정</a:t>
+                </a:r>
+              </a:p>
+              <a:p>
+                <a:endParaRPr lang="ko-KR" altLang="en-US" dirty="0"/>
+              </a:p>
+            </p:txBody>
+          </p:sp>
+        </mc:Choice>
+        <mc:Fallback>
+          <p:sp>
+            <p:nvSpPr>
+              <p:cNvPr id="3" name="내용 개체 틀 2">
+                <a:extLst>
+                  <a:ext uri="{FF2B5EF4-FFF2-40B4-BE49-F238E27FC236}">
+                    <a16:creationId xmlns:a16="http://schemas.microsoft.com/office/drawing/2014/main" id="{F06A6085-F993-7E79-20E4-92FB6F0F2F6A}"/>
+                  </a:ext>
+                </a:extLst>
+              </p:cNvPr>
+              <p:cNvSpPr>
+                <a:spLocks noGrp="1" noRot="1" noChangeAspect="1" noMove="1" noResize="1" noEditPoints="1" noAdjustHandles="1" noChangeArrowheads="1" noChangeShapeType="1" noTextEdit="1"/>
+              </p:cNvSpPr>
+              <p:nvPr>
+                <p:ph idx="1"/>
+              </p:nvPr>
+            </p:nvSpPr>
+            <p:spPr>
+              <a:xfrm>
+                <a:off x="828675" y="4153916"/>
+                <a:ext cx="7991475" cy="2170684"/>
+              </a:xfrm>
+              <a:blipFill>
+                <a:blip r:embed="rId2"/>
+                <a:stretch>
+                  <a:fillRect l="-915" t="-2801"/>
+                </a:stretch>
+              </a:blipFill>
+            </p:spPr>
+            <p:txBody>
+              <a:bodyPr/>
+              <a:lstStyle/>
+              <a:p>
+                <a:r>
+                  <a:rPr lang="ko-KR" altLang="en-US">
+                    <a:noFill/>
+                  </a:rPr>
+                  <a:t> </a:t>
+                </a:r>
+              </a:p>
+            </p:txBody>
+          </p:sp>
+        </mc:Fallback>
+      </mc:AlternateContent>
+      <p:pic>
+        <p:nvPicPr>
+          <p:cNvPr id="5" name="그림 4">
+            <a:extLst>
+              <a:ext uri="{FF2B5EF4-FFF2-40B4-BE49-F238E27FC236}">
+                <a16:creationId xmlns:a16="http://schemas.microsoft.com/office/drawing/2014/main" id="{33C7A926-DBAC-45AC-BDBC-6EBA5B2ED85D}"/>
+              </a:ext>
+            </a:extLst>
+          </p:cNvPr>
+          <p:cNvPicPr>
+            <a:picLocks noChangeAspect="1"/>
+          </p:cNvPicPr>
+          <p:nvPr/>
+        </p:nvPicPr>
+        <p:blipFill>
+          <a:blip r:embed="rId3"/>
+          <a:stretch>
+            <a:fillRect/>
+          </a:stretch>
+        </p:blipFill>
+        <p:spPr>
+          <a:xfrm>
+            <a:off x="828675" y="1060758"/>
+            <a:ext cx="4823446" cy="1063996"/>
+          </a:xfrm>
+          <a:prstGeom prst="rect">
+            <a:avLst/>
+          </a:prstGeom>
+        </p:spPr>
+      </p:pic>
+      <p:pic>
+        <p:nvPicPr>
+          <p:cNvPr id="7" name="그림 6">
+            <a:extLst>
+              <a:ext uri="{FF2B5EF4-FFF2-40B4-BE49-F238E27FC236}">
+                <a16:creationId xmlns:a16="http://schemas.microsoft.com/office/drawing/2014/main" id="{46BC1B9F-5512-BEA2-6852-4227E257EFDC}"/>
+              </a:ext>
+            </a:extLst>
+          </p:cNvPr>
+          <p:cNvPicPr>
+            <a:picLocks noChangeAspect="1"/>
+          </p:cNvPicPr>
+          <p:nvPr/>
+        </p:nvPicPr>
+        <p:blipFill>
+          <a:blip r:embed="rId4"/>
+          <a:stretch>
+            <a:fillRect/>
+          </a:stretch>
+        </p:blipFill>
+        <p:spPr>
+          <a:xfrm>
+            <a:off x="828675" y="2252370"/>
+            <a:ext cx="3268960" cy="595306"/>
+          </a:xfrm>
+          <a:prstGeom prst="rect">
+            <a:avLst/>
+          </a:prstGeom>
+        </p:spPr>
+      </p:pic>
+      <p:pic>
+        <p:nvPicPr>
+          <p:cNvPr id="9" name="그림 8">
+            <a:extLst>
+              <a:ext uri="{FF2B5EF4-FFF2-40B4-BE49-F238E27FC236}">
+                <a16:creationId xmlns:a16="http://schemas.microsoft.com/office/drawing/2014/main" id="{2DDAA5CB-86E0-0470-485B-4A38D20EEC15}"/>
+              </a:ext>
+            </a:extLst>
+          </p:cNvPr>
+          <p:cNvPicPr>
+            <a:picLocks noChangeAspect="1"/>
+          </p:cNvPicPr>
+          <p:nvPr/>
+        </p:nvPicPr>
+        <p:blipFill>
+          <a:blip r:embed="rId5"/>
+          <a:stretch>
+            <a:fillRect/>
+          </a:stretch>
+        </p:blipFill>
+        <p:spPr>
+          <a:xfrm>
+            <a:off x="828675" y="2916158"/>
+            <a:ext cx="4372585" cy="590632"/>
+          </a:xfrm>
+          <a:prstGeom prst="rect">
+            <a:avLst/>
+          </a:prstGeom>
+        </p:spPr>
+      </p:pic>
+      <p:pic>
+        <p:nvPicPr>
+          <p:cNvPr id="11" name="그림 10">
+            <a:extLst>
+              <a:ext uri="{FF2B5EF4-FFF2-40B4-BE49-F238E27FC236}">
+                <a16:creationId xmlns:a16="http://schemas.microsoft.com/office/drawing/2014/main" id="{BAC881D6-CEAE-9101-AF47-9755AEDE4B20}"/>
+              </a:ext>
+            </a:extLst>
+          </p:cNvPr>
+          <p:cNvPicPr>
+            <a:picLocks noChangeAspect="1"/>
+          </p:cNvPicPr>
+          <p:nvPr/>
+        </p:nvPicPr>
+        <p:blipFill>
+          <a:blip r:embed="rId6"/>
+          <a:stretch>
+            <a:fillRect/>
+          </a:stretch>
+        </p:blipFill>
+        <p:spPr>
+          <a:xfrm>
+            <a:off x="825467" y="3575272"/>
+            <a:ext cx="2447181" cy="578644"/>
+          </a:xfrm>
+          <a:prstGeom prst="rect">
+            <a:avLst/>
+          </a:prstGeom>
+        </p:spPr>
+      </p:pic>
+    </p:spTree>
+    <p:extLst>
+      <p:ext uri="{BB962C8B-B14F-4D97-AF65-F5344CB8AC3E}">
+        <p14:creationId xmlns:p14="http://schemas.microsoft.com/office/powerpoint/2010/main" val="2896789203"/>
+      </p:ext>
+    </p:extLst>
+  </p:cSld>
+  <p:clrMapOvr>
+    <a:masterClrMapping/>
+  </p:clrMapOvr>
+</p:sld>
+</file>
+
+<file path=ppt/slides/slide17.xml><?xml version="1.0" encoding="utf-8"?>
 <p:sld xmlns:a="http://schemas.openxmlformats.org/drawingml/2006/main" xmlns:r="http://schemas.openxmlformats.org/officeDocument/2006/relationships" xmlns:p="http://schemas.openxmlformats.org/presentationml/2006/main">
   <p:cSld>
     <p:spTree>
@@ -4736,7 +7490,7 @@
 </p:sld>
 </file>
 
-<file path=ppt/slides/slide13.xml><?xml version="1.0" encoding="utf-8"?>
+<file path=ppt/slides/slide18.xml><?xml version="1.0" encoding="utf-8"?>
 <p:sld xmlns:a="http://schemas.openxmlformats.org/drawingml/2006/main" xmlns:r="http://schemas.openxmlformats.org/officeDocument/2006/relationships" xmlns:p="http://schemas.openxmlformats.org/presentationml/2006/main">
   <p:cSld>
     <p:spTree>
@@ -5287,8 +8041,8 @@
           </a:p>
         </p:txBody>
       </p:sp>
-      <mc:AlternateContent xmlns:mc="http://schemas.openxmlformats.org/markup-compatibility/2006">
-        <mc:Choice xmlns:a14="http://schemas.microsoft.com/office/drawing/2010/main" Requires="a14">
+      <mc:AlternateContent xmlns:mc="http://schemas.openxmlformats.org/markup-compatibility/2006" xmlns:a14="http://schemas.microsoft.com/office/drawing/2010/main">
+        <mc:Choice Requires="a14">
           <p:sp>
             <p:nvSpPr>
               <p:cNvPr id="3" name="내용 개체 틀 2">
@@ -5530,7 +8284,7 @@
             </p:txBody>
           </p:sp>
         </mc:Choice>
-        <mc:Fallback>
+        <mc:Fallback xmlns="">
           <p:sp>
             <p:nvSpPr>
               <p:cNvPr id="3" name="내용 개체 틀 2">
@@ -5685,8 +8439,8 @@
           </a:p>
         </p:txBody>
       </p:sp>
-      <mc:AlternateContent xmlns:mc="http://schemas.openxmlformats.org/markup-compatibility/2006">
-        <mc:Choice xmlns:a14="http://schemas.microsoft.com/office/drawing/2010/main" Requires="a14">
+      <mc:AlternateContent xmlns:mc="http://schemas.openxmlformats.org/markup-compatibility/2006" xmlns:a14="http://schemas.microsoft.com/office/drawing/2010/main">
+        <mc:Choice Requires="a14">
           <p:sp>
             <p:nvSpPr>
               <p:cNvPr id="3" name="내용 개체 틀 2">
@@ -5811,7 +8565,7 @@
             </p:txBody>
           </p:sp>
         </mc:Choice>
-        <mc:Fallback>
+        <mc:Fallback xmlns="">
           <p:sp>
             <p:nvSpPr>
               <p:cNvPr id="3" name="내용 개체 틀 2">
@@ -6287,8 +9041,8 @@
           </a:xfrm>
         </p:spPr>
       </p:pic>
-      <mc:AlternateContent xmlns:mc="http://schemas.openxmlformats.org/markup-compatibility/2006">
-        <mc:Choice xmlns:a14="http://schemas.microsoft.com/office/drawing/2010/main" Requires="a14">
+      <mc:AlternateContent xmlns:mc="http://schemas.openxmlformats.org/markup-compatibility/2006" xmlns:a14="http://schemas.microsoft.com/office/drawing/2010/main">
+        <mc:Choice Requires="a14">
           <p:sp>
             <p:nvSpPr>
               <p:cNvPr id="6" name="내용 개체 틀 2">
@@ -6535,7 +9289,7 @@
             </p:txBody>
           </p:sp>
         </mc:Choice>
-        <mc:Fallback>
+        <mc:Fallback xmlns="">
           <p:sp>
             <p:nvSpPr>
               <p:cNvPr id="6" name="내용 개체 틀 2">
@@ -6727,8 +9481,8 @@
           </a:xfrm>
         </p:spPr>
       </p:pic>
-      <mc:AlternateContent xmlns:mc="http://schemas.openxmlformats.org/markup-compatibility/2006">
-        <mc:Choice xmlns:a14="http://schemas.microsoft.com/office/drawing/2010/main" Requires="a14">
+      <mc:AlternateContent xmlns:mc="http://schemas.openxmlformats.org/markup-compatibility/2006" xmlns:a14="http://schemas.microsoft.com/office/drawing/2010/main">
+        <mc:Choice Requires="a14">
           <p:sp>
             <p:nvSpPr>
               <p:cNvPr id="6" name="내용 개체 틀 2">
@@ -7106,7 +9860,7 @@
             </p:txBody>
           </p:sp>
         </mc:Choice>
-        <mc:Fallback>
+        <mc:Fallback xmlns="">
           <p:sp>
             <p:nvSpPr>
               <p:cNvPr id="6" name="내용 개체 틀 2">

</xml_diff>

<commit_message>
modified SpyTorch-1.ppt, 24-05-13 세미나
</commit_message>
<xml_diff>
--- a/cs semina/07_Spytorch-1.pptx
+++ b/cs semina/07_Spytorch-1.pptx
@@ -4611,8 +4611,8 @@
           </a:p>
         </p:txBody>
       </p:sp>
-      <mc:AlternateContent xmlns:mc="http://schemas.openxmlformats.org/markup-compatibility/2006">
-        <mc:Choice xmlns:a14="http://schemas.microsoft.com/office/drawing/2010/main" Requires="a14">
+      <mc:AlternateContent xmlns:mc="http://schemas.openxmlformats.org/markup-compatibility/2006" xmlns:a14="http://schemas.microsoft.com/office/drawing/2010/main">
+        <mc:Choice Requires="a14">
           <p:sp>
             <p:nvSpPr>
               <p:cNvPr id="3" name="내용 개체 틀 2">
@@ -4777,7 +4777,7 @@
             </p:txBody>
           </p:sp>
         </mc:Choice>
-        <mc:Fallback>
+        <mc:Fallback xmlns="">
           <p:sp>
             <p:nvSpPr>
               <p:cNvPr id="3" name="내용 개체 틀 2">
@@ -4991,15 +4991,7 @@
                 </a:r>
                 <a:r>
                   <a:rPr kumimoji="1" lang="ko-KR" altLang="en-US" sz="2400" dirty="0"/>
-                  <a:t>시냅스 </a:t>
-                </a:r>
-                <a:r>
-                  <a:rPr kumimoji="1" lang="ko-KR" altLang="en-US" sz="2400" dirty="0" err="1"/>
-                  <a:t>붕괘</a:t>
-                </a:r>
-                <a:r>
-                  <a:rPr kumimoji="1" lang="ko-KR" altLang="en-US" sz="2400" dirty="0"/>
-                  <a:t> 상수</a:t>
+                  <a:t>시냅스 붕괴 상수</a:t>
                 </a:r>
                 <a:r>
                   <a:rPr kumimoji="1" lang="en-US" altLang="ko-KR" sz="2400" dirty="0"/>
@@ -5351,8 +5343,8 @@
           </a:p>
         </p:txBody>
       </p:sp>
-      <mc:AlternateContent xmlns:mc="http://schemas.openxmlformats.org/markup-compatibility/2006">
-        <mc:Choice xmlns:a14="http://schemas.microsoft.com/office/drawing/2010/main" Requires="a14">
+      <mc:AlternateContent xmlns:mc="http://schemas.openxmlformats.org/markup-compatibility/2006" xmlns:a14="http://schemas.microsoft.com/office/drawing/2010/main">
+        <mc:Choice Requires="a14">
           <p:sp>
             <p:nvSpPr>
               <p:cNvPr id="3" name="내용 개체 틀 2">
@@ -5518,7 +5510,7 @@
             </p:txBody>
           </p:sp>
         </mc:Choice>
-        <mc:Fallback>
+        <mc:Fallback xmlns="">
           <p:sp>
             <p:nvSpPr>
               <p:cNvPr id="3" name="내용 개체 틀 2">
@@ -5693,8 +5685,8 @@
           </a:p>
         </p:txBody>
       </p:sp>
-      <mc:AlternateContent xmlns:mc="http://schemas.openxmlformats.org/markup-compatibility/2006">
-        <mc:Choice xmlns:a14="http://schemas.microsoft.com/office/drawing/2010/main" Requires="a14">
+      <mc:AlternateContent xmlns:mc="http://schemas.openxmlformats.org/markup-compatibility/2006" xmlns:a14="http://schemas.microsoft.com/office/drawing/2010/main">
+        <mc:Choice Requires="a14">
           <p:sp>
             <p:nvSpPr>
               <p:cNvPr id="8" name="TextBox 7">
@@ -5824,7 +5816,7 @@
             </p:txBody>
           </p:sp>
         </mc:Choice>
-        <mc:Fallback>
+        <mc:Fallback xmlns="">
           <p:sp>
             <p:nvSpPr>
               <p:cNvPr id="8" name="TextBox 7">
@@ -6031,8 +6023,8 @@
           </a:p>
         </p:txBody>
       </p:sp>
-      <mc:AlternateContent xmlns:mc="http://schemas.openxmlformats.org/markup-compatibility/2006">
-        <mc:Choice xmlns:a14="http://schemas.microsoft.com/office/drawing/2010/main" Requires="a14">
+      <mc:AlternateContent xmlns:mc="http://schemas.openxmlformats.org/markup-compatibility/2006" xmlns:a14="http://schemas.microsoft.com/office/drawing/2010/main">
+        <mc:Choice Requires="a14">
           <p:sp>
             <p:nvSpPr>
               <p:cNvPr id="3" name="내용 개체 틀 2">
@@ -6164,7 +6156,7 @@
             </p:txBody>
           </p:sp>
         </mc:Choice>
-        <mc:Fallback>
+        <mc:Fallback xmlns="">
           <p:sp>
             <p:nvSpPr>
               <p:cNvPr id="3" name="내용 개체 틀 2">
@@ -6339,8 +6331,8 @@
           </a:p>
         </p:txBody>
       </p:sp>
-      <mc:AlternateContent xmlns:mc="http://schemas.openxmlformats.org/markup-compatibility/2006">
-        <mc:Choice xmlns:a14="http://schemas.microsoft.com/office/drawing/2010/main" Requires="a14">
+      <mc:AlternateContent xmlns:mc="http://schemas.openxmlformats.org/markup-compatibility/2006" xmlns:a14="http://schemas.microsoft.com/office/drawing/2010/main">
+        <mc:Choice Requires="a14">
           <p:sp>
             <p:nvSpPr>
               <p:cNvPr id="9" name="TextBox 8">
@@ -6374,6 +6366,7 @@
               </a:bodyPr>
               <a:lstStyle/>
               <a:p>
+                <a:pPr/>
                 <a14:m>
                   <m:oMathPara xmlns:m="http://schemas.openxmlformats.org/officeDocument/2006/math">
                     <m:oMathParaPr>
@@ -6519,7 +6512,7 @@
             </p:txBody>
           </p:sp>
         </mc:Choice>
-        <mc:Fallback>
+        <mc:Fallback xmlns="">
           <p:sp>
             <p:nvSpPr>
               <p:cNvPr id="9" name="TextBox 8">
@@ -6640,8 +6633,8 @@
           </a:p>
         </p:txBody>
       </p:sp>
-      <mc:AlternateContent xmlns:mc="http://schemas.openxmlformats.org/markup-compatibility/2006">
-        <mc:Choice xmlns:a14="http://schemas.microsoft.com/office/drawing/2010/main" Requires="a14">
+      <mc:AlternateContent xmlns:mc="http://schemas.openxmlformats.org/markup-compatibility/2006" xmlns:a14="http://schemas.microsoft.com/office/drawing/2010/main">
+        <mc:Choice Requires="a14">
           <p:sp>
             <p:nvSpPr>
               <p:cNvPr id="3" name="내용 개체 틀 2">
@@ -6847,7 +6840,7 @@
             </p:txBody>
           </p:sp>
         </mc:Choice>
-        <mc:Fallback>
+        <mc:Fallback xmlns="">
           <p:sp>
             <p:nvSpPr>
               <p:cNvPr id="3" name="내용 개체 틀 2">
@@ -7012,8 +7005,8 @@
           </a:p>
         </p:txBody>
       </p:sp>
-      <mc:AlternateContent xmlns:mc="http://schemas.openxmlformats.org/markup-compatibility/2006">
-        <mc:Choice xmlns:a14="http://schemas.microsoft.com/office/drawing/2010/main" Requires="a14">
+      <mc:AlternateContent xmlns:mc="http://schemas.openxmlformats.org/markup-compatibility/2006" xmlns:a14="http://schemas.microsoft.com/office/drawing/2010/main">
+        <mc:Choice Requires="a14">
           <p:sp>
             <p:nvSpPr>
               <p:cNvPr id="3" name="내용 개체 틀 2">
@@ -7183,7 +7176,7 @@
             </p:txBody>
           </p:sp>
         </mc:Choice>
-        <mc:Fallback>
+        <mc:Fallback xmlns="">
           <p:sp>
             <p:nvSpPr>
               <p:cNvPr id="3" name="내용 개체 틀 2">
@@ -7704,7 +7697,14 @@
           <a:p>
             <a:r>
               <a:rPr kumimoji="1" lang="ko-KR" altLang="en-US" dirty="0"/>
-              <a:t>간단한 실제 문제를 해결하기 위한 신경망 구축</a:t>
+              <a:t>간단한 실제 문제를 해결하기 위한 신경망 </a:t>
+            </a:r>
+            <a:br>
+              <a:rPr kumimoji="1" lang="en-US" altLang="ko-KR" dirty="0"/>
+            </a:br>
+            <a:r>
+              <a:rPr kumimoji="1" lang="ko-KR" altLang="en-US" dirty="0"/>
+              <a:t>구축</a:t>
             </a:r>
             <a:endParaRPr kumimoji="1" lang="en-US" altLang="ko-KR" dirty="0"/>
           </a:p>
@@ -7746,7 +7746,14 @@
             </a:r>
             <a:r>
               <a:rPr kumimoji="1" lang="ko-KR" altLang="en-US" dirty="0"/>
-              <a:t>의 이진 특성에 의한 기울기 소실 문제 해결 방안 제시</a:t>
+              <a:t>의 이진 특성에 의한 기울기 </a:t>
+            </a:r>
+            <a:br>
+              <a:rPr kumimoji="1" lang="en-US" altLang="ko-KR" dirty="0"/>
+            </a:br>
+            <a:r>
+              <a:rPr kumimoji="1" lang="ko-KR" altLang="en-US" dirty="0"/>
+              <a:t>소실 문제 해결 방안 제시</a:t>
             </a:r>
             <a:endParaRPr kumimoji="1" lang="en-US" altLang="ko-KR" dirty="0"/>
           </a:p>
@@ -7779,6 +7786,9 @@
               <a:rPr lang="ko-KR" altLang="en-US" dirty="0"/>
               <a:t> 신경망을 </a:t>
             </a:r>
+            <a:br>
+              <a:rPr lang="en-US" altLang="ko-KR" dirty="0"/>
+            </a:br>
             <a:r>
               <a:rPr lang="en-US" altLang="ko-KR" dirty="0"/>
               <a:t>RNN(Recurrent Neural Network)</a:t>
@@ -9853,7 +9863,14 @@
                 </a:r>
                 <a:r>
                   <a:rPr lang="ko-KR" altLang="en-US" sz="2400" kern="0" dirty="0"/>
-                  <a:t>뉴런이 방출하는 모든 스파이크의 합</a:t>
+                  <a:t>뉴런이 방출하는 모든 </a:t>
+                </a:r>
+                <a:br>
+                  <a:rPr lang="en-US" altLang="ko-KR" sz="2400" kern="0" dirty="0"/>
+                </a:br>
+                <a:r>
+                  <a:rPr lang="ko-KR" altLang="en-US" sz="2400" kern="0" dirty="0"/>
+                  <a:t>스파이크의 합</a:t>
                 </a:r>
                 <a:endParaRPr lang="en-US" altLang="ko-KR" sz="2400" kern="0" dirty="0"/>
               </a:p>
@@ -9886,7 +9903,7 @@
               <a:blipFill>
                 <a:blip r:embed="rId3"/>
                 <a:stretch>
-                  <a:fillRect l="-1600" t="-1938" b="-3488"/>
+                  <a:fillRect l="-1694" t="-2056" b="-3551"/>
                 </a:stretch>
               </a:blipFill>
               <a:ln w="9525">

</xml_diff>